<commit_message>
added react testing files, changed html icon
</commit_message>
<xml_diff>
--- a/project_journal/standup/sprint3_standup.pptx
+++ b/project_journal/standup/sprint3_standup.pptx
@@ -16,6 +16,15 @@
     <p:sldId id="261" r:id="rId10"/>
     <p:sldId id="260" r:id="rId11"/>
     <p:sldId id="259" r:id="rId12"/>
+    <p:sldId id="267" r:id="rId13"/>
+    <p:sldId id="268" r:id="rId14"/>
+    <p:sldId id="275" r:id="rId15"/>
+    <p:sldId id="269" r:id="rId16"/>
+    <p:sldId id="274" r:id="rId17"/>
+    <p:sldId id="270" r:id="rId18"/>
+    <p:sldId id="273" r:id="rId19"/>
+    <p:sldId id="271" r:id="rId20"/>
+    <p:sldId id="272" r:id="rId21"/>
   </p:sldIdLst>
   <p:sldSz cx="12192000" cy="6858000"/>
   <p:notesSz cx="6858000" cy="9144000"/>
@@ -3142,6 +3151,1236 @@
           <c:extLst>
             <c:ext xmlns:c16="http://schemas.microsoft.com/office/drawing/2014/chart" uri="{C3380CC4-5D6E-409C-BE32-E72D297353CC}">
               <c16:uniqueId val="{00000033-78B6-4AAC-BD45-EAAA8BBD23A6}"/>
+            </c:ext>
+          </c:extLst>
+        </c:ser>
+        <c:dLbls>
+          <c:showLegendKey val="0"/>
+          <c:showVal val="0"/>
+          <c:showCatName val="0"/>
+          <c:showSerName val="0"/>
+          <c:showPercent val="0"/>
+          <c:showBubbleSize val="0"/>
+        </c:dLbls>
+        <c:gapWidth val="150"/>
+        <c:overlap val="100"/>
+        <c:axId val="182342479"/>
+        <c:axId val="182340079"/>
+      </c:barChart>
+      <c:catAx>
+        <c:axId val="182342479"/>
+        <c:scaling>
+          <c:orientation val="maxMin"/>
+        </c:scaling>
+        <c:delete val="0"/>
+        <c:axPos val="l"/>
+        <c:numFmt formatCode="General" sourceLinked="1"/>
+        <c:majorTickMark val="none"/>
+        <c:minorTickMark val="none"/>
+        <c:tickLblPos val="nextTo"/>
+        <c:spPr>
+          <a:noFill/>
+          <a:ln w="9525" cap="flat" cmpd="sng" algn="ctr">
+            <a:solidFill>
+              <a:schemeClr val="tx1">
+                <a:lumMod val="15000"/>
+                <a:lumOff val="85000"/>
+              </a:schemeClr>
+            </a:solidFill>
+            <a:round/>
+          </a:ln>
+          <a:effectLst/>
+        </c:spPr>
+        <c:txPr>
+          <a:bodyPr rot="-60000000" spcFirstLastPara="1" vertOverflow="ellipsis" vert="horz" wrap="square" anchor="ctr" anchorCtr="1"/>
+          <a:lstStyle/>
+          <a:p>
+            <a:pPr>
+              <a:defRPr sz="900" b="0" i="0" u="none" strike="noStrike" kern="1200" baseline="0">
+                <a:solidFill>
+                  <a:schemeClr val="tx1">
+                    <a:lumMod val="65000"/>
+                    <a:lumOff val="35000"/>
+                  </a:schemeClr>
+                </a:solidFill>
+                <a:latin typeface="+mn-lt"/>
+                <a:ea typeface="+mn-ea"/>
+                <a:cs typeface="+mn-cs"/>
+              </a:defRPr>
+            </a:pPr>
+            <a:endParaRPr lang="en-US"/>
+          </a:p>
+        </c:txPr>
+        <c:crossAx val="182340079"/>
+        <c:crosses val="autoZero"/>
+        <c:auto val="1"/>
+        <c:lblAlgn val="ctr"/>
+        <c:lblOffset val="100"/>
+        <c:noMultiLvlLbl val="0"/>
+      </c:catAx>
+      <c:valAx>
+        <c:axId val="182340079"/>
+        <c:scaling>
+          <c:orientation val="minMax"/>
+          <c:max val="45814"/>
+          <c:min val="45806"/>
+        </c:scaling>
+        <c:delete val="0"/>
+        <c:axPos val="t"/>
+        <c:majorGridlines>
+          <c:spPr>
+            <a:ln w="9525" cap="flat" cmpd="sng" algn="ctr">
+              <a:solidFill>
+                <a:schemeClr val="tx1">
+                  <a:lumMod val="15000"/>
+                  <a:lumOff val="85000"/>
+                </a:schemeClr>
+              </a:solidFill>
+              <a:round/>
+            </a:ln>
+            <a:effectLst/>
+          </c:spPr>
+        </c:majorGridlines>
+        <c:numFmt formatCode="[$-409]d\-mmm;@" sourceLinked="1"/>
+        <c:majorTickMark val="none"/>
+        <c:minorTickMark val="none"/>
+        <c:tickLblPos val="nextTo"/>
+        <c:spPr>
+          <a:noFill/>
+          <a:ln>
+            <a:noFill/>
+          </a:ln>
+          <a:effectLst/>
+        </c:spPr>
+        <c:txPr>
+          <a:bodyPr rot="-60000000" spcFirstLastPara="1" vertOverflow="ellipsis" vert="horz" wrap="square" anchor="ctr" anchorCtr="1"/>
+          <a:lstStyle/>
+          <a:p>
+            <a:pPr>
+              <a:defRPr sz="900" b="0" i="0" u="none" strike="noStrike" kern="1200" baseline="0">
+                <a:solidFill>
+                  <a:schemeClr val="tx1">
+                    <a:lumMod val="65000"/>
+                    <a:lumOff val="35000"/>
+                  </a:schemeClr>
+                </a:solidFill>
+                <a:latin typeface="+mn-lt"/>
+                <a:ea typeface="+mn-ea"/>
+                <a:cs typeface="+mn-cs"/>
+              </a:defRPr>
+            </a:pPr>
+            <a:endParaRPr lang="en-US"/>
+          </a:p>
+        </c:txPr>
+        <c:crossAx val="182342479"/>
+        <c:crosses val="autoZero"/>
+        <c:crossBetween val="between"/>
+        <c:majorUnit val="1"/>
+      </c:valAx>
+    </c:plotArea>
+    <c:plotVisOnly val="1"/>
+    <c:dispBlanksAs val="gap"/>
+    <c:showDLblsOverMax val="0"/>
+    <c:extLst/>
+  </c:chart>
+  <c:txPr>
+    <a:bodyPr/>
+    <a:lstStyle/>
+    <a:p>
+      <a:pPr>
+        <a:defRPr/>
+      </a:pPr>
+      <a:endParaRPr lang="en-US"/>
+    </a:p>
+  </c:txPr>
+  <c:externalData r:id="rId1">
+    <c:autoUpdate val="0"/>
+  </c:externalData>
+</c:chartSpace>
+</file>
+
+<file path=ppt/charts/chart4.xml><?xml version="1.0" encoding="utf-8"?>
+<c:chartSpace xmlns:c="http://schemas.openxmlformats.org/drawingml/2006/chart" xmlns:a="http://schemas.openxmlformats.org/drawingml/2006/main" xmlns:r="http://schemas.openxmlformats.org/officeDocument/2006/relationships" xmlns:c16r2="http://schemas.microsoft.com/office/drawing/2015/06/chart">
+  <c:date1904 val="0"/>
+  <c:lang val="en-US"/>
+  <c:roundedCorners val="0"/>
+  <mc:AlternateContent xmlns:mc="http://schemas.openxmlformats.org/markup-compatibility/2006">
+    <mc:Choice xmlns:c14="http://schemas.microsoft.com/office/drawing/2007/8/2/chart" Requires="c14">
+      <c14:style val="102"/>
+    </mc:Choice>
+    <mc:Fallback>
+      <c:style val="2"/>
+    </mc:Fallback>
+  </mc:AlternateContent>
+  <c:chart>
+    <c:title>
+      <c:tx>
+        <c:rich>
+          <a:bodyPr rot="0" spcFirstLastPara="1" vertOverflow="ellipsis" vert="horz" wrap="square" anchor="ctr" anchorCtr="1"/>
+          <a:lstStyle/>
+          <a:p>
+            <a:pPr>
+              <a:defRPr sz="1400" b="0" i="0" u="none" strike="noStrike" kern="1200" spc="0" baseline="0">
+                <a:solidFill>
+                  <a:schemeClr val="tx1">
+                    <a:lumMod val="65000"/>
+                    <a:lumOff val="35000"/>
+                  </a:schemeClr>
+                </a:solidFill>
+                <a:latin typeface="+mn-lt"/>
+                <a:ea typeface="+mn-ea"/>
+                <a:cs typeface="+mn-cs"/>
+              </a:defRPr>
+            </a:pPr>
+            <a:r>
+              <a:rPr lang="en-US"/>
+              <a:t>Sprint 3 Timeline</a:t>
+            </a:r>
+          </a:p>
+        </c:rich>
+      </c:tx>
+      <c:overlay val="0"/>
+      <c:spPr>
+        <a:noFill/>
+        <a:ln>
+          <a:noFill/>
+        </a:ln>
+        <a:effectLst/>
+      </c:spPr>
+    </c:title>
+    <c:autoTitleDeleted val="0"/>
+    <c:plotArea>
+      <c:layout/>
+      <c:barChart>
+        <c:barDir val="bar"/>
+        <c:grouping val="stacked"/>
+        <c:varyColors val="0"/>
+        <c:ser>
+          <c:idx val="2"/>
+          <c:order val="0"/>
+          <c:tx>
+            <c:strRef>
+              <c:f>'Sprint 3'!$D$1</c:f>
+              <c:strCache>
+                <c:ptCount val="1"/>
+                <c:pt idx="0">
+                  <c:v>Start_Date</c:v>
+                </c:pt>
+              </c:strCache>
+            </c:strRef>
+          </c:tx>
+          <c:spPr>
+            <a:noFill/>
+          </c:spPr>
+          <c:invertIfNegative val="0"/>
+          <c:cat>
+            <c:strRef>
+              <c:f>'Sprint 3'!$C$2:$C$18</c:f>
+              <c:strCache>
+                <c:ptCount val="17"/>
+                <c:pt idx="0">
+                  <c:v>React Styles - Project</c:v>
+                </c:pt>
+                <c:pt idx="1">
+                  <c:v>React Styles - Quiz</c:v>
+                </c:pt>
+                <c:pt idx="2">
+                  <c:v>React Forms - Lesson</c:v>
+                </c:pt>
+                <c:pt idx="3">
+                  <c:v>React Forms - Article</c:v>
+                </c:pt>
+                <c:pt idx="4">
+                  <c:v>React Forms - Project</c:v>
+                </c:pt>
+                <c:pt idx="5">
+                  <c:v>React Forms - Quiz</c:v>
+                </c:pt>
+                <c:pt idx="6">
+                  <c:v>Second React Quiz</c:v>
+                </c:pt>
+                <c:pt idx="7">
+                  <c:v>Third React Quiz</c:v>
+                </c:pt>
+                <c:pt idx="8">
+                  <c:v>Calendar popup</c:v>
+                </c:pt>
+                <c:pt idx="9">
+                  <c:v>Numeric column w restrictions</c:v>
+                </c:pt>
+                <c:pt idx="10">
+                  <c:v>Category dropdown menu</c:v>
+                </c:pt>
+                <c:pt idx="11">
+                  <c:v>Load categories from txt</c:v>
+                </c:pt>
+                <c:pt idx="12">
+                  <c:v>Time sum</c:v>
+                </c:pt>
+                <c:pt idx="13">
+                  <c:v>Additional page button</c:v>
+                </c:pt>
+                <c:pt idx="14">
+                  <c:v>Cell clickability</c:v>
+                </c:pt>
+                <c:pt idx="15">
+                  <c:v>Delete row</c:v>
+                </c:pt>
+                <c:pt idx="16">
+                  <c:v>Write unit tests</c:v>
+                </c:pt>
+              </c:strCache>
+            </c:strRef>
+          </c:cat>
+          <c:val>
+            <c:numRef>
+              <c:f>'Sprint 3'!$D$2:$D$18</c:f>
+              <c:numCache>
+                <c:formatCode>[$-409]d\-mmm;@</c:formatCode>
+                <c:ptCount val="17"/>
+                <c:pt idx="0">
+                  <c:v>45806</c:v>
+                </c:pt>
+                <c:pt idx="1">
+                  <c:v>45806</c:v>
+                </c:pt>
+                <c:pt idx="2">
+                  <c:v>45807</c:v>
+                </c:pt>
+                <c:pt idx="3">
+                  <c:v>45807</c:v>
+                </c:pt>
+                <c:pt idx="4">
+                  <c:v>45807</c:v>
+                </c:pt>
+                <c:pt idx="5">
+                  <c:v>45807</c:v>
+                </c:pt>
+                <c:pt idx="6">
+                  <c:v>45808</c:v>
+                </c:pt>
+                <c:pt idx="7">
+                  <c:v>45808</c:v>
+                </c:pt>
+                <c:pt idx="8">
+                  <c:v>45809</c:v>
+                </c:pt>
+                <c:pt idx="9">
+                  <c:v>45809</c:v>
+                </c:pt>
+                <c:pt idx="10">
+                  <c:v>45809</c:v>
+                </c:pt>
+                <c:pt idx="11">
+                  <c:v>45810</c:v>
+                </c:pt>
+                <c:pt idx="12">
+                  <c:v>45810</c:v>
+                </c:pt>
+                <c:pt idx="13">
+                  <c:v>45811</c:v>
+                </c:pt>
+                <c:pt idx="14">
+                  <c:v>45812</c:v>
+                </c:pt>
+                <c:pt idx="15">
+                  <c:v>45812</c:v>
+                </c:pt>
+                <c:pt idx="16">
+                  <c:v>45813</c:v>
+                </c:pt>
+              </c:numCache>
+            </c:numRef>
+          </c:val>
+          <c:extLst>
+            <c:ext xmlns:c16="http://schemas.microsoft.com/office/drawing/2014/chart" uri="{C3380CC4-5D6E-409C-BE32-E72D297353CC}">
+              <c16:uniqueId val="{00000000-AEF2-4243-9D00-2F63672EAFFD}"/>
+            </c:ext>
+          </c:extLst>
+        </c:ser>
+        <c:ser>
+          <c:idx val="3"/>
+          <c:order val="1"/>
+          <c:tx>
+            <c:strRef>
+              <c:f>'Sprint 3'!$F$1</c:f>
+              <c:strCache>
+                <c:ptCount val="1"/>
+                <c:pt idx="0">
+                  <c:v>Duration</c:v>
+                </c:pt>
+              </c:strCache>
+            </c:strRef>
+          </c:tx>
+          <c:spPr>
+            <a:solidFill>
+              <a:schemeClr val="tx1">
+                <a:lumMod val="75000"/>
+                <a:lumOff val="25000"/>
+              </a:schemeClr>
+            </a:solidFill>
+          </c:spPr>
+          <c:invertIfNegative val="0"/>
+          <c:dPt>
+            <c:idx val="0"/>
+            <c:invertIfNegative val="0"/>
+            <c:bubble3D val="0"/>
+            <c:spPr>
+              <a:solidFill>
+                <a:srgbClr val="00B050"/>
+              </a:solidFill>
+              <a:ln>
+                <a:noFill/>
+              </a:ln>
+              <a:effectLst/>
+            </c:spPr>
+            <c:extLst>
+              <c:ext xmlns:c16="http://schemas.microsoft.com/office/drawing/2014/chart" uri="{C3380CC4-5D6E-409C-BE32-E72D297353CC}">
+                <c16:uniqueId val="{00000002-AEF2-4243-9D00-2F63672EAFFD}"/>
+              </c:ext>
+            </c:extLst>
+          </c:dPt>
+          <c:dPt>
+            <c:idx val="1"/>
+            <c:invertIfNegative val="0"/>
+            <c:bubble3D val="0"/>
+            <c:spPr>
+              <a:solidFill>
+                <a:srgbClr val="00B050"/>
+              </a:solidFill>
+              <a:ln>
+                <a:noFill/>
+              </a:ln>
+              <a:effectLst/>
+            </c:spPr>
+            <c:extLst>
+              <c:ext xmlns:c16="http://schemas.microsoft.com/office/drawing/2014/chart" uri="{C3380CC4-5D6E-409C-BE32-E72D297353CC}">
+                <c16:uniqueId val="{00000004-AEF2-4243-9D00-2F63672EAFFD}"/>
+              </c:ext>
+            </c:extLst>
+          </c:dPt>
+          <c:dPt>
+            <c:idx val="2"/>
+            <c:invertIfNegative val="0"/>
+            <c:bubble3D val="0"/>
+            <c:spPr>
+              <a:solidFill>
+                <a:srgbClr val="00B050"/>
+              </a:solidFill>
+              <a:ln>
+                <a:noFill/>
+              </a:ln>
+              <a:effectLst/>
+            </c:spPr>
+            <c:extLst>
+              <c:ext xmlns:c16="http://schemas.microsoft.com/office/drawing/2014/chart" uri="{C3380CC4-5D6E-409C-BE32-E72D297353CC}">
+                <c16:uniqueId val="{00000006-AEF2-4243-9D00-2F63672EAFFD}"/>
+              </c:ext>
+            </c:extLst>
+          </c:dPt>
+          <c:dPt>
+            <c:idx val="3"/>
+            <c:invertIfNegative val="0"/>
+            <c:bubble3D val="0"/>
+            <c:spPr>
+              <a:solidFill>
+                <a:srgbClr val="00B050"/>
+              </a:solidFill>
+              <a:ln>
+                <a:noFill/>
+              </a:ln>
+              <a:effectLst/>
+            </c:spPr>
+            <c:extLst>
+              <c:ext xmlns:c16="http://schemas.microsoft.com/office/drawing/2014/chart" uri="{C3380CC4-5D6E-409C-BE32-E72D297353CC}">
+                <c16:uniqueId val="{00000008-AEF2-4243-9D00-2F63672EAFFD}"/>
+              </c:ext>
+            </c:extLst>
+          </c:dPt>
+          <c:dPt>
+            <c:idx val="4"/>
+            <c:invertIfNegative val="0"/>
+            <c:bubble3D val="0"/>
+            <c:spPr>
+              <a:solidFill>
+                <a:srgbClr val="00B050"/>
+              </a:solidFill>
+              <a:ln>
+                <a:noFill/>
+              </a:ln>
+              <a:effectLst/>
+            </c:spPr>
+            <c:extLst>
+              <c:ext xmlns:c16="http://schemas.microsoft.com/office/drawing/2014/chart" uri="{C3380CC4-5D6E-409C-BE32-E72D297353CC}">
+                <c16:uniqueId val="{0000000A-AEF2-4243-9D00-2F63672EAFFD}"/>
+              </c:ext>
+            </c:extLst>
+          </c:dPt>
+          <c:dPt>
+            <c:idx val="5"/>
+            <c:invertIfNegative val="0"/>
+            <c:bubble3D val="0"/>
+            <c:spPr>
+              <a:solidFill>
+                <a:srgbClr val="00B050"/>
+              </a:solidFill>
+              <a:ln>
+                <a:noFill/>
+              </a:ln>
+              <a:effectLst/>
+            </c:spPr>
+            <c:extLst>
+              <c:ext xmlns:c16="http://schemas.microsoft.com/office/drawing/2014/chart" uri="{C3380CC4-5D6E-409C-BE32-E72D297353CC}">
+                <c16:uniqueId val="{0000000C-AEF2-4243-9D00-2F63672EAFFD}"/>
+              </c:ext>
+            </c:extLst>
+          </c:dPt>
+          <c:dPt>
+            <c:idx val="6"/>
+            <c:invertIfNegative val="0"/>
+            <c:bubble3D val="0"/>
+            <c:spPr>
+              <a:solidFill>
+                <a:srgbClr val="00B050"/>
+              </a:solidFill>
+              <a:ln>
+                <a:noFill/>
+              </a:ln>
+              <a:effectLst/>
+            </c:spPr>
+            <c:extLst>
+              <c:ext xmlns:c16="http://schemas.microsoft.com/office/drawing/2014/chart" uri="{C3380CC4-5D6E-409C-BE32-E72D297353CC}">
+                <c16:uniqueId val="{0000000E-AEF2-4243-9D00-2F63672EAFFD}"/>
+              </c:ext>
+            </c:extLst>
+          </c:dPt>
+          <c:dPt>
+            <c:idx val="7"/>
+            <c:invertIfNegative val="0"/>
+            <c:bubble3D val="0"/>
+            <c:spPr>
+              <a:solidFill>
+                <a:srgbClr val="00B050"/>
+              </a:solidFill>
+              <a:ln>
+                <a:noFill/>
+              </a:ln>
+              <a:effectLst/>
+            </c:spPr>
+            <c:extLst>
+              <c:ext xmlns:c16="http://schemas.microsoft.com/office/drawing/2014/chart" uri="{C3380CC4-5D6E-409C-BE32-E72D297353CC}">
+                <c16:uniqueId val="{00000010-AEF2-4243-9D00-2F63672EAFFD}"/>
+              </c:ext>
+            </c:extLst>
+          </c:dPt>
+          <c:dPt>
+            <c:idx val="8"/>
+            <c:invertIfNegative val="0"/>
+            <c:bubble3D val="0"/>
+            <c:spPr>
+              <a:solidFill>
+                <a:srgbClr val="00B050"/>
+              </a:solidFill>
+            </c:spPr>
+            <c:extLst>
+              <c:ext xmlns:c16="http://schemas.microsoft.com/office/drawing/2014/chart" uri="{C3380CC4-5D6E-409C-BE32-E72D297353CC}">
+                <c16:uniqueId val="{00000012-AEF2-4243-9D00-2F63672EAFFD}"/>
+              </c:ext>
+            </c:extLst>
+          </c:dPt>
+          <c:dPt>
+            <c:idx val="9"/>
+            <c:invertIfNegative val="0"/>
+            <c:bubble3D val="0"/>
+            <c:spPr>
+              <a:solidFill>
+                <a:srgbClr val="00B050"/>
+              </a:solidFill>
+            </c:spPr>
+            <c:extLst>
+              <c:ext xmlns:c16="http://schemas.microsoft.com/office/drawing/2014/chart" uri="{C3380CC4-5D6E-409C-BE32-E72D297353CC}">
+                <c16:uniqueId val="{00000014-AEF2-4243-9D00-2F63672EAFFD}"/>
+              </c:ext>
+            </c:extLst>
+          </c:dPt>
+          <c:dPt>
+            <c:idx val="10"/>
+            <c:invertIfNegative val="0"/>
+            <c:bubble3D val="0"/>
+            <c:spPr>
+              <a:solidFill>
+                <a:srgbClr val="00B050"/>
+              </a:solidFill>
+            </c:spPr>
+            <c:extLst>
+              <c:ext xmlns:c16="http://schemas.microsoft.com/office/drawing/2014/chart" uri="{C3380CC4-5D6E-409C-BE32-E72D297353CC}">
+                <c16:uniqueId val="{00000016-AEF2-4243-9D00-2F63672EAFFD}"/>
+              </c:ext>
+            </c:extLst>
+          </c:dPt>
+          <c:dPt>
+            <c:idx val="11"/>
+            <c:invertIfNegative val="0"/>
+            <c:bubble3D val="0"/>
+            <c:spPr>
+              <a:solidFill>
+                <a:srgbClr val="00B050"/>
+              </a:solidFill>
+            </c:spPr>
+            <c:extLst>
+              <c:ext xmlns:c16="http://schemas.microsoft.com/office/drawing/2014/chart" uri="{C3380CC4-5D6E-409C-BE32-E72D297353CC}">
+                <c16:uniqueId val="{00000018-AEF2-4243-9D00-2F63672EAFFD}"/>
+              </c:ext>
+            </c:extLst>
+          </c:dPt>
+          <c:dPt>
+            <c:idx val="12"/>
+            <c:invertIfNegative val="0"/>
+            <c:bubble3D val="0"/>
+            <c:spPr>
+              <a:solidFill>
+                <a:srgbClr val="00B050"/>
+              </a:solidFill>
+            </c:spPr>
+            <c:extLst>
+              <c:ext xmlns:c16="http://schemas.microsoft.com/office/drawing/2014/chart" uri="{C3380CC4-5D6E-409C-BE32-E72D297353CC}">
+                <c16:uniqueId val="{0000001A-AEF2-4243-9D00-2F63672EAFFD}"/>
+              </c:ext>
+            </c:extLst>
+          </c:dPt>
+          <c:dPt>
+            <c:idx val="13"/>
+            <c:invertIfNegative val="0"/>
+            <c:bubble3D val="0"/>
+            <c:spPr>
+              <a:solidFill>
+                <a:srgbClr val="00B050"/>
+              </a:solidFill>
+            </c:spPr>
+            <c:extLst>
+              <c:ext xmlns:c16="http://schemas.microsoft.com/office/drawing/2014/chart" uri="{C3380CC4-5D6E-409C-BE32-E72D297353CC}">
+                <c16:uniqueId val="{0000001C-AEF2-4243-9D00-2F63672EAFFD}"/>
+              </c:ext>
+            </c:extLst>
+          </c:dPt>
+          <c:dPt>
+            <c:idx val="14"/>
+            <c:invertIfNegative val="0"/>
+            <c:bubble3D val="0"/>
+            <c:spPr>
+              <a:solidFill>
+                <a:srgbClr val="00B050"/>
+              </a:solidFill>
+            </c:spPr>
+            <c:extLst>
+              <c:ext xmlns:c16="http://schemas.microsoft.com/office/drawing/2014/chart" uri="{C3380CC4-5D6E-409C-BE32-E72D297353CC}">
+                <c16:uniqueId val="{0000001E-AEF2-4243-9D00-2F63672EAFFD}"/>
+              </c:ext>
+            </c:extLst>
+          </c:dPt>
+          <c:dPt>
+            <c:idx val="15"/>
+            <c:invertIfNegative val="0"/>
+            <c:bubble3D val="0"/>
+            <c:spPr>
+              <a:solidFill>
+                <a:srgbClr val="00B050"/>
+              </a:solidFill>
+            </c:spPr>
+            <c:extLst>
+              <c:ext xmlns:c16="http://schemas.microsoft.com/office/drawing/2014/chart" uri="{C3380CC4-5D6E-409C-BE32-E72D297353CC}">
+                <c16:uniqueId val="{00000020-AEF2-4243-9D00-2F63672EAFFD}"/>
+              </c:ext>
+            </c:extLst>
+          </c:dPt>
+          <c:dPt>
+            <c:idx val="16"/>
+            <c:invertIfNegative val="0"/>
+            <c:bubble3D val="0"/>
+            <c:spPr>
+              <a:solidFill>
+                <a:srgbClr val="FF3300"/>
+              </a:solidFill>
+            </c:spPr>
+            <c:extLst>
+              <c:ext xmlns:c16="http://schemas.microsoft.com/office/drawing/2014/chart" uri="{C3380CC4-5D6E-409C-BE32-E72D297353CC}">
+                <c16:uniqueId val="{00000022-AEF2-4243-9D00-2F63672EAFFD}"/>
+              </c:ext>
+            </c:extLst>
+          </c:dPt>
+          <c:cat>
+            <c:strRef>
+              <c:f>'Sprint 3'!$C$2:$C$18</c:f>
+              <c:strCache>
+                <c:ptCount val="17"/>
+                <c:pt idx="0">
+                  <c:v>React Styles - Project</c:v>
+                </c:pt>
+                <c:pt idx="1">
+                  <c:v>React Styles - Quiz</c:v>
+                </c:pt>
+                <c:pt idx="2">
+                  <c:v>React Forms - Lesson</c:v>
+                </c:pt>
+                <c:pt idx="3">
+                  <c:v>React Forms - Article</c:v>
+                </c:pt>
+                <c:pt idx="4">
+                  <c:v>React Forms - Project</c:v>
+                </c:pt>
+                <c:pt idx="5">
+                  <c:v>React Forms - Quiz</c:v>
+                </c:pt>
+                <c:pt idx="6">
+                  <c:v>Second React Quiz</c:v>
+                </c:pt>
+                <c:pt idx="7">
+                  <c:v>Third React Quiz</c:v>
+                </c:pt>
+                <c:pt idx="8">
+                  <c:v>Calendar popup</c:v>
+                </c:pt>
+                <c:pt idx="9">
+                  <c:v>Numeric column w restrictions</c:v>
+                </c:pt>
+                <c:pt idx="10">
+                  <c:v>Category dropdown menu</c:v>
+                </c:pt>
+                <c:pt idx="11">
+                  <c:v>Load categories from txt</c:v>
+                </c:pt>
+                <c:pt idx="12">
+                  <c:v>Time sum</c:v>
+                </c:pt>
+                <c:pt idx="13">
+                  <c:v>Additional page button</c:v>
+                </c:pt>
+                <c:pt idx="14">
+                  <c:v>Cell clickability</c:v>
+                </c:pt>
+                <c:pt idx="15">
+                  <c:v>Delete row</c:v>
+                </c:pt>
+                <c:pt idx="16">
+                  <c:v>Write unit tests</c:v>
+                </c:pt>
+              </c:strCache>
+            </c:strRef>
+          </c:cat>
+          <c:val>
+            <c:numRef>
+              <c:f>'Sprint 3'!$F$2:$F$18</c:f>
+              <c:numCache>
+                <c:formatCode>General</c:formatCode>
+                <c:ptCount val="17"/>
+                <c:pt idx="0">
+                  <c:v>1</c:v>
+                </c:pt>
+                <c:pt idx="1">
+                  <c:v>1</c:v>
+                </c:pt>
+                <c:pt idx="2">
+                  <c:v>1</c:v>
+                </c:pt>
+                <c:pt idx="3">
+                  <c:v>1</c:v>
+                </c:pt>
+                <c:pt idx="4">
+                  <c:v>1</c:v>
+                </c:pt>
+                <c:pt idx="5">
+                  <c:v>1</c:v>
+                </c:pt>
+                <c:pt idx="6">
+                  <c:v>1</c:v>
+                </c:pt>
+                <c:pt idx="7">
+                  <c:v>1</c:v>
+                </c:pt>
+                <c:pt idx="8">
+                  <c:v>1</c:v>
+                </c:pt>
+                <c:pt idx="9">
+                  <c:v>1</c:v>
+                </c:pt>
+                <c:pt idx="10">
+                  <c:v>1</c:v>
+                </c:pt>
+                <c:pt idx="11">
+                  <c:v>1</c:v>
+                </c:pt>
+                <c:pt idx="12">
+                  <c:v>1</c:v>
+                </c:pt>
+                <c:pt idx="13">
+                  <c:v>1</c:v>
+                </c:pt>
+                <c:pt idx="14">
+                  <c:v>1</c:v>
+                </c:pt>
+                <c:pt idx="15">
+                  <c:v>1</c:v>
+                </c:pt>
+                <c:pt idx="16">
+                  <c:v>1</c:v>
+                </c:pt>
+              </c:numCache>
+            </c:numRef>
+          </c:val>
+          <c:extLst>
+            <c:ext xmlns:c16="http://schemas.microsoft.com/office/drawing/2014/chart" uri="{C3380CC4-5D6E-409C-BE32-E72D297353CC}">
+              <c16:uniqueId val="{00000023-AEF2-4243-9D00-2F63672EAFFD}"/>
+            </c:ext>
+          </c:extLst>
+        </c:ser>
+        <c:ser>
+          <c:idx val="0"/>
+          <c:order val="2"/>
+          <c:tx>
+            <c:strRef>
+              <c:f>'Sprint 3'!$D$1</c:f>
+              <c:strCache>
+                <c:ptCount val="1"/>
+                <c:pt idx="0">
+                  <c:v>Start_Date</c:v>
+                </c:pt>
+              </c:strCache>
+            </c:strRef>
+          </c:tx>
+          <c:spPr>
+            <a:noFill/>
+            <a:ln>
+              <a:noFill/>
+            </a:ln>
+            <a:effectLst/>
+          </c:spPr>
+          <c:invertIfNegative val="0"/>
+          <c:cat>
+            <c:strRef>
+              <c:f>'Sprint 3'!$C$2:$C$18</c:f>
+              <c:strCache>
+                <c:ptCount val="17"/>
+                <c:pt idx="0">
+                  <c:v>React Styles - Project</c:v>
+                </c:pt>
+                <c:pt idx="1">
+                  <c:v>React Styles - Quiz</c:v>
+                </c:pt>
+                <c:pt idx="2">
+                  <c:v>React Forms - Lesson</c:v>
+                </c:pt>
+                <c:pt idx="3">
+                  <c:v>React Forms - Article</c:v>
+                </c:pt>
+                <c:pt idx="4">
+                  <c:v>React Forms - Project</c:v>
+                </c:pt>
+                <c:pt idx="5">
+                  <c:v>React Forms - Quiz</c:v>
+                </c:pt>
+                <c:pt idx="6">
+                  <c:v>Second React Quiz</c:v>
+                </c:pt>
+                <c:pt idx="7">
+                  <c:v>Third React Quiz</c:v>
+                </c:pt>
+                <c:pt idx="8">
+                  <c:v>Calendar popup</c:v>
+                </c:pt>
+                <c:pt idx="9">
+                  <c:v>Numeric column w restrictions</c:v>
+                </c:pt>
+                <c:pt idx="10">
+                  <c:v>Category dropdown menu</c:v>
+                </c:pt>
+                <c:pt idx="11">
+                  <c:v>Load categories from txt</c:v>
+                </c:pt>
+                <c:pt idx="12">
+                  <c:v>Time sum</c:v>
+                </c:pt>
+                <c:pt idx="13">
+                  <c:v>Additional page button</c:v>
+                </c:pt>
+                <c:pt idx="14">
+                  <c:v>Cell clickability</c:v>
+                </c:pt>
+                <c:pt idx="15">
+                  <c:v>Delete row</c:v>
+                </c:pt>
+                <c:pt idx="16">
+                  <c:v>Write unit tests</c:v>
+                </c:pt>
+              </c:strCache>
+            </c:strRef>
+          </c:cat>
+          <c:val>
+            <c:numRef>
+              <c:f>'Sprint 3'!$D$2:$D$18</c:f>
+              <c:numCache>
+                <c:formatCode>[$-409]d\-mmm;@</c:formatCode>
+                <c:ptCount val="17"/>
+                <c:pt idx="0">
+                  <c:v>45806</c:v>
+                </c:pt>
+                <c:pt idx="1">
+                  <c:v>45806</c:v>
+                </c:pt>
+                <c:pt idx="2">
+                  <c:v>45807</c:v>
+                </c:pt>
+                <c:pt idx="3">
+                  <c:v>45807</c:v>
+                </c:pt>
+                <c:pt idx="4">
+                  <c:v>45807</c:v>
+                </c:pt>
+                <c:pt idx="5">
+                  <c:v>45807</c:v>
+                </c:pt>
+                <c:pt idx="6">
+                  <c:v>45808</c:v>
+                </c:pt>
+                <c:pt idx="7">
+                  <c:v>45808</c:v>
+                </c:pt>
+                <c:pt idx="8">
+                  <c:v>45809</c:v>
+                </c:pt>
+                <c:pt idx="9">
+                  <c:v>45809</c:v>
+                </c:pt>
+                <c:pt idx="10">
+                  <c:v>45809</c:v>
+                </c:pt>
+                <c:pt idx="11">
+                  <c:v>45810</c:v>
+                </c:pt>
+                <c:pt idx="12">
+                  <c:v>45810</c:v>
+                </c:pt>
+                <c:pt idx="13">
+                  <c:v>45811</c:v>
+                </c:pt>
+                <c:pt idx="14">
+                  <c:v>45812</c:v>
+                </c:pt>
+                <c:pt idx="15">
+                  <c:v>45812</c:v>
+                </c:pt>
+                <c:pt idx="16">
+                  <c:v>45813</c:v>
+                </c:pt>
+              </c:numCache>
+            </c:numRef>
+          </c:val>
+          <c:extLst>
+            <c:ext xmlns:c16="http://schemas.microsoft.com/office/drawing/2014/chart" uri="{C3380CC4-5D6E-409C-BE32-E72D297353CC}">
+              <c16:uniqueId val="{00000024-AEF2-4243-9D00-2F63672EAFFD}"/>
+            </c:ext>
+          </c:extLst>
+        </c:ser>
+        <c:ser>
+          <c:idx val="1"/>
+          <c:order val="3"/>
+          <c:tx>
+            <c:strRef>
+              <c:f>'Sprint 3'!$F$1</c:f>
+              <c:strCache>
+                <c:ptCount val="1"/>
+                <c:pt idx="0">
+                  <c:v>Duration</c:v>
+                </c:pt>
+              </c:strCache>
+            </c:strRef>
+          </c:tx>
+          <c:spPr>
+            <a:solidFill>
+              <a:schemeClr val="tx1">
+                <a:lumMod val="75000"/>
+                <a:lumOff val="25000"/>
+              </a:schemeClr>
+            </a:solidFill>
+            <a:ln>
+              <a:noFill/>
+            </a:ln>
+            <a:effectLst/>
+          </c:spPr>
+          <c:invertIfNegative val="0"/>
+          <c:dPt>
+            <c:idx val="0"/>
+            <c:invertIfNegative val="0"/>
+            <c:bubble3D val="0"/>
+            <c:spPr>
+              <a:solidFill>
+                <a:srgbClr val="00B0F0"/>
+              </a:solidFill>
+              <a:ln>
+                <a:noFill/>
+              </a:ln>
+              <a:effectLst/>
+            </c:spPr>
+            <c:extLst>
+              <c:ext xmlns:c16="http://schemas.microsoft.com/office/drawing/2014/chart" uri="{C3380CC4-5D6E-409C-BE32-E72D297353CC}">
+                <c16:uniqueId val="{00000026-AEF2-4243-9D00-2F63672EAFFD}"/>
+              </c:ext>
+            </c:extLst>
+          </c:dPt>
+          <c:dPt>
+            <c:idx val="1"/>
+            <c:invertIfNegative val="0"/>
+            <c:bubble3D val="0"/>
+            <c:spPr>
+              <a:solidFill>
+                <a:srgbClr val="00B0F0"/>
+              </a:solidFill>
+              <a:ln>
+                <a:noFill/>
+              </a:ln>
+              <a:effectLst/>
+            </c:spPr>
+            <c:extLst>
+              <c:ext xmlns:c16="http://schemas.microsoft.com/office/drawing/2014/chart" uri="{C3380CC4-5D6E-409C-BE32-E72D297353CC}">
+                <c16:uniqueId val="{00000028-AEF2-4243-9D00-2F63672EAFFD}"/>
+              </c:ext>
+            </c:extLst>
+          </c:dPt>
+          <c:dPt>
+            <c:idx val="2"/>
+            <c:invertIfNegative val="0"/>
+            <c:bubble3D val="0"/>
+            <c:spPr>
+              <a:solidFill>
+                <a:srgbClr val="00B0F0"/>
+              </a:solidFill>
+              <a:ln>
+                <a:noFill/>
+              </a:ln>
+              <a:effectLst/>
+            </c:spPr>
+            <c:extLst>
+              <c:ext xmlns:c16="http://schemas.microsoft.com/office/drawing/2014/chart" uri="{C3380CC4-5D6E-409C-BE32-E72D297353CC}">
+                <c16:uniqueId val="{0000002A-AEF2-4243-9D00-2F63672EAFFD}"/>
+              </c:ext>
+            </c:extLst>
+          </c:dPt>
+          <c:dPt>
+            <c:idx val="3"/>
+            <c:invertIfNegative val="0"/>
+            <c:bubble3D val="0"/>
+            <c:spPr>
+              <a:solidFill>
+                <a:srgbClr val="00B0F0"/>
+              </a:solidFill>
+              <a:ln>
+                <a:noFill/>
+              </a:ln>
+              <a:effectLst/>
+            </c:spPr>
+            <c:extLst>
+              <c:ext xmlns:c16="http://schemas.microsoft.com/office/drawing/2014/chart" uri="{C3380CC4-5D6E-409C-BE32-E72D297353CC}">
+                <c16:uniqueId val="{0000002C-AEF2-4243-9D00-2F63672EAFFD}"/>
+              </c:ext>
+            </c:extLst>
+          </c:dPt>
+          <c:dPt>
+            <c:idx val="4"/>
+            <c:invertIfNegative val="0"/>
+            <c:bubble3D val="0"/>
+            <c:spPr>
+              <a:solidFill>
+                <a:srgbClr val="00B0F0"/>
+              </a:solidFill>
+              <a:ln>
+                <a:noFill/>
+              </a:ln>
+              <a:effectLst/>
+            </c:spPr>
+            <c:extLst>
+              <c:ext xmlns:c16="http://schemas.microsoft.com/office/drawing/2014/chart" uri="{C3380CC4-5D6E-409C-BE32-E72D297353CC}">
+                <c16:uniqueId val="{0000002E-AEF2-4243-9D00-2F63672EAFFD}"/>
+              </c:ext>
+            </c:extLst>
+          </c:dPt>
+          <c:dPt>
+            <c:idx val="5"/>
+            <c:invertIfNegative val="0"/>
+            <c:bubble3D val="0"/>
+            <c:spPr>
+              <a:solidFill>
+                <a:srgbClr val="00B0F0"/>
+              </a:solidFill>
+              <a:ln>
+                <a:noFill/>
+              </a:ln>
+              <a:effectLst/>
+            </c:spPr>
+            <c:extLst>
+              <c:ext xmlns:c16="http://schemas.microsoft.com/office/drawing/2014/chart" uri="{C3380CC4-5D6E-409C-BE32-E72D297353CC}">
+                <c16:uniqueId val="{00000030-AEF2-4243-9D00-2F63672EAFFD}"/>
+              </c:ext>
+            </c:extLst>
+          </c:dPt>
+          <c:dPt>
+            <c:idx val="6"/>
+            <c:invertIfNegative val="0"/>
+            <c:bubble3D val="0"/>
+            <c:spPr>
+              <a:solidFill>
+                <a:schemeClr val="accent5"/>
+              </a:solidFill>
+              <a:ln>
+                <a:noFill/>
+              </a:ln>
+              <a:effectLst/>
+            </c:spPr>
+            <c:extLst>
+              <c:ext xmlns:c16="http://schemas.microsoft.com/office/drawing/2014/chart" uri="{C3380CC4-5D6E-409C-BE32-E72D297353CC}">
+                <c16:uniqueId val="{00000032-AEF2-4243-9D00-2F63672EAFFD}"/>
+              </c:ext>
+            </c:extLst>
+          </c:dPt>
+          <c:dPt>
+            <c:idx val="7"/>
+            <c:invertIfNegative val="0"/>
+            <c:bubble3D val="0"/>
+            <c:spPr>
+              <a:solidFill>
+                <a:schemeClr val="accent5"/>
+              </a:solidFill>
+              <a:ln>
+                <a:noFill/>
+              </a:ln>
+              <a:effectLst/>
+            </c:spPr>
+            <c:extLst>
+              <c:ext xmlns:c16="http://schemas.microsoft.com/office/drawing/2014/chart" uri="{C3380CC4-5D6E-409C-BE32-E72D297353CC}">
+                <c16:uniqueId val="{00000034-AEF2-4243-9D00-2F63672EAFFD}"/>
+              </c:ext>
+            </c:extLst>
+          </c:dPt>
+          <c:cat>
+            <c:strRef>
+              <c:f>'Sprint 3'!$C$2:$C$18</c:f>
+              <c:strCache>
+                <c:ptCount val="17"/>
+                <c:pt idx="0">
+                  <c:v>React Styles - Project</c:v>
+                </c:pt>
+                <c:pt idx="1">
+                  <c:v>React Styles - Quiz</c:v>
+                </c:pt>
+                <c:pt idx="2">
+                  <c:v>React Forms - Lesson</c:v>
+                </c:pt>
+                <c:pt idx="3">
+                  <c:v>React Forms - Article</c:v>
+                </c:pt>
+                <c:pt idx="4">
+                  <c:v>React Forms - Project</c:v>
+                </c:pt>
+                <c:pt idx="5">
+                  <c:v>React Forms - Quiz</c:v>
+                </c:pt>
+                <c:pt idx="6">
+                  <c:v>Second React Quiz</c:v>
+                </c:pt>
+                <c:pt idx="7">
+                  <c:v>Third React Quiz</c:v>
+                </c:pt>
+                <c:pt idx="8">
+                  <c:v>Calendar popup</c:v>
+                </c:pt>
+                <c:pt idx="9">
+                  <c:v>Numeric column w restrictions</c:v>
+                </c:pt>
+                <c:pt idx="10">
+                  <c:v>Category dropdown menu</c:v>
+                </c:pt>
+                <c:pt idx="11">
+                  <c:v>Load categories from txt</c:v>
+                </c:pt>
+                <c:pt idx="12">
+                  <c:v>Time sum</c:v>
+                </c:pt>
+                <c:pt idx="13">
+                  <c:v>Additional page button</c:v>
+                </c:pt>
+                <c:pt idx="14">
+                  <c:v>Cell clickability</c:v>
+                </c:pt>
+                <c:pt idx="15">
+                  <c:v>Delete row</c:v>
+                </c:pt>
+                <c:pt idx="16">
+                  <c:v>Write unit tests</c:v>
+                </c:pt>
+              </c:strCache>
+            </c:strRef>
+          </c:cat>
+          <c:val>
+            <c:numRef>
+              <c:f>'Sprint 3'!$F$2:$F$18</c:f>
+              <c:numCache>
+                <c:formatCode>General</c:formatCode>
+                <c:ptCount val="17"/>
+                <c:pt idx="0">
+                  <c:v>1</c:v>
+                </c:pt>
+                <c:pt idx="1">
+                  <c:v>1</c:v>
+                </c:pt>
+                <c:pt idx="2">
+                  <c:v>1</c:v>
+                </c:pt>
+                <c:pt idx="3">
+                  <c:v>1</c:v>
+                </c:pt>
+                <c:pt idx="4">
+                  <c:v>1</c:v>
+                </c:pt>
+                <c:pt idx="5">
+                  <c:v>1</c:v>
+                </c:pt>
+                <c:pt idx="6">
+                  <c:v>1</c:v>
+                </c:pt>
+                <c:pt idx="7">
+                  <c:v>1</c:v>
+                </c:pt>
+                <c:pt idx="8">
+                  <c:v>1</c:v>
+                </c:pt>
+                <c:pt idx="9">
+                  <c:v>1</c:v>
+                </c:pt>
+                <c:pt idx="10">
+                  <c:v>1</c:v>
+                </c:pt>
+                <c:pt idx="11">
+                  <c:v>1</c:v>
+                </c:pt>
+                <c:pt idx="12">
+                  <c:v>1</c:v>
+                </c:pt>
+                <c:pt idx="13">
+                  <c:v>1</c:v>
+                </c:pt>
+                <c:pt idx="14">
+                  <c:v>1</c:v>
+                </c:pt>
+                <c:pt idx="15">
+                  <c:v>1</c:v>
+                </c:pt>
+                <c:pt idx="16">
+                  <c:v>1</c:v>
+                </c:pt>
+              </c:numCache>
+            </c:numRef>
+          </c:val>
+          <c:extLst>
+            <c:ext xmlns:c16="http://schemas.microsoft.com/office/drawing/2014/chart" uri="{C3380CC4-5D6E-409C-BE32-E72D297353CC}">
+              <c16:uniqueId val="{00000035-AEF2-4243-9D00-2F63672EAFFD}"/>
             </c:ext>
           </c:extLst>
         </c:ser>
@@ -3982,7 +5221,7 @@
           <a:p>
             <a:fld id="{C5760A9E-F5D7-4040-B515-3D966B4E754C}" type="datetimeFigureOut">
               <a:rPr lang="en-US" smtClean="0"/>
-              <a:t>6/3/2025</a:t>
+              <a:t>6/9/2025</a:t>
             </a:fld>
             <a:endParaRPr lang="en-US"/>
           </a:p>
@@ -4180,7 +5419,7 @@
           <a:p>
             <a:fld id="{C5760A9E-F5D7-4040-B515-3D966B4E754C}" type="datetimeFigureOut">
               <a:rPr lang="en-US" smtClean="0"/>
-              <a:t>6/3/2025</a:t>
+              <a:t>6/9/2025</a:t>
             </a:fld>
             <a:endParaRPr lang="en-US"/>
           </a:p>
@@ -4388,7 +5627,7 @@
           <a:p>
             <a:fld id="{C5760A9E-F5D7-4040-B515-3D966B4E754C}" type="datetimeFigureOut">
               <a:rPr lang="en-US" smtClean="0"/>
-              <a:t>6/3/2025</a:t>
+              <a:t>6/9/2025</a:t>
             </a:fld>
             <a:endParaRPr lang="en-US"/>
           </a:p>
@@ -4586,7 +5825,7 @@
           <a:p>
             <a:fld id="{C5760A9E-F5D7-4040-B515-3D966B4E754C}" type="datetimeFigureOut">
               <a:rPr lang="en-US" smtClean="0"/>
-              <a:t>6/3/2025</a:t>
+              <a:t>6/9/2025</a:t>
             </a:fld>
             <a:endParaRPr lang="en-US"/>
           </a:p>
@@ -4861,7 +6100,7 @@
           <a:p>
             <a:fld id="{C5760A9E-F5D7-4040-B515-3D966B4E754C}" type="datetimeFigureOut">
               <a:rPr lang="en-US" smtClean="0"/>
-              <a:t>6/3/2025</a:t>
+              <a:t>6/9/2025</a:t>
             </a:fld>
             <a:endParaRPr lang="en-US"/>
           </a:p>
@@ -5126,7 +6365,7 @@
           <a:p>
             <a:fld id="{C5760A9E-F5D7-4040-B515-3D966B4E754C}" type="datetimeFigureOut">
               <a:rPr lang="en-US" smtClean="0"/>
-              <a:t>6/3/2025</a:t>
+              <a:t>6/9/2025</a:t>
             </a:fld>
             <a:endParaRPr lang="en-US"/>
           </a:p>
@@ -5538,7 +6777,7 @@
           <a:p>
             <a:fld id="{C5760A9E-F5D7-4040-B515-3D966B4E754C}" type="datetimeFigureOut">
               <a:rPr lang="en-US" smtClean="0"/>
-              <a:t>6/3/2025</a:t>
+              <a:t>6/9/2025</a:t>
             </a:fld>
             <a:endParaRPr lang="en-US"/>
           </a:p>
@@ -5679,7 +6918,7 @@
           <a:p>
             <a:fld id="{C5760A9E-F5D7-4040-B515-3D966B4E754C}" type="datetimeFigureOut">
               <a:rPr lang="en-US" smtClean="0"/>
-              <a:t>6/3/2025</a:t>
+              <a:t>6/9/2025</a:t>
             </a:fld>
             <a:endParaRPr lang="en-US"/>
           </a:p>
@@ -5792,7 +7031,7 @@
           <a:p>
             <a:fld id="{C5760A9E-F5D7-4040-B515-3D966B4E754C}" type="datetimeFigureOut">
               <a:rPr lang="en-US" smtClean="0"/>
-              <a:t>6/3/2025</a:t>
+              <a:t>6/9/2025</a:t>
             </a:fld>
             <a:endParaRPr lang="en-US"/>
           </a:p>
@@ -6103,7 +7342,7 @@
           <a:p>
             <a:fld id="{C5760A9E-F5D7-4040-B515-3D966B4E754C}" type="datetimeFigureOut">
               <a:rPr lang="en-US" smtClean="0"/>
-              <a:t>6/3/2025</a:t>
+              <a:t>6/9/2025</a:t>
             </a:fld>
             <a:endParaRPr lang="en-US"/>
           </a:p>
@@ -6391,7 +7630,7 @@
           <a:p>
             <a:fld id="{C5760A9E-F5D7-4040-B515-3D966B4E754C}" type="datetimeFigureOut">
               <a:rPr lang="en-US" smtClean="0"/>
-              <a:t>6/3/2025</a:t>
+              <a:t>6/9/2025</a:t>
             </a:fld>
             <a:endParaRPr lang="en-US"/>
           </a:p>
@@ -6632,7 +7871,7 @@
           <a:p>
             <a:fld id="{C5760A9E-F5D7-4040-B515-3D966B4E754C}" type="datetimeFigureOut">
               <a:rPr lang="en-US" smtClean="0"/>
-              <a:t>6/3/2025</a:t>
+              <a:t>6/9/2025</a:t>
             </a:fld>
             <a:endParaRPr lang="en-US"/>
           </a:p>
@@ -7108,7 +8347,7 @@
             </a:r>
             <a:r>
               <a:rPr lang="en-US" dirty="0"/>
-              <a:t>, 2025</a:t>
+              <a:t>, 2025 - </a:t>
             </a:r>
           </a:p>
         </p:txBody>
@@ -7365,6 +8604,1321 @@
 </p:sld>
 </file>
 
+<file path=ppt/slides/slide12.xml><?xml version="1.0" encoding="utf-8"?>
+<p:sld xmlns:a="http://schemas.openxmlformats.org/drawingml/2006/main" xmlns:r="http://schemas.openxmlformats.org/officeDocument/2006/relationships" xmlns:p="http://schemas.openxmlformats.org/presentationml/2006/main">
+  <p:cSld>
+    <p:spTree>
+      <p:nvGrpSpPr>
+        <p:cNvPr id="1" name=""/>
+        <p:cNvGrpSpPr/>
+        <p:nvPr/>
+      </p:nvGrpSpPr>
+      <p:grpSpPr>
+        <a:xfrm>
+          <a:off x="0" y="0"/>
+          <a:ext cx="0" cy="0"/>
+          <a:chOff x="0" y="0"/>
+          <a:chExt cx="0" cy="0"/>
+        </a:xfrm>
+      </p:grpSpPr>
+      <p:sp>
+        <p:nvSpPr>
+          <p:cNvPr id="2" name="Title 1">
+            <a:extLst>
+              <a:ext uri="{FF2B5EF4-FFF2-40B4-BE49-F238E27FC236}">
+                <a16:creationId xmlns:a16="http://schemas.microsoft.com/office/drawing/2014/main" id="{D3382099-A172-7F29-9D39-775E7B5301CC}"/>
+              </a:ext>
+            </a:extLst>
+          </p:cNvPr>
+          <p:cNvSpPr>
+            <a:spLocks noGrp="1"/>
+          </p:cNvSpPr>
+          <p:nvPr>
+            <p:ph type="title"/>
+          </p:nvPr>
+        </p:nvSpPr>
+        <p:spPr/>
+        <p:txBody>
+          <a:bodyPr/>
+          <a:lstStyle/>
+          <a:p>
+            <a:r>
+              <a:rPr lang="en-US" dirty="0"/>
+              <a:t>Agenda #2 (Sunday June 7th)</a:t>
+            </a:r>
+          </a:p>
+        </p:txBody>
+      </p:sp>
+      <p:sp>
+        <p:nvSpPr>
+          <p:cNvPr id="3" name="Content Placeholder 2">
+            <a:extLst>
+              <a:ext uri="{FF2B5EF4-FFF2-40B4-BE49-F238E27FC236}">
+                <a16:creationId xmlns:a16="http://schemas.microsoft.com/office/drawing/2014/main" id="{8D7FB504-473B-FA85-5818-ECBAAE7B6F01}"/>
+              </a:ext>
+            </a:extLst>
+          </p:cNvPr>
+          <p:cNvSpPr>
+            <a:spLocks noGrp="1"/>
+          </p:cNvSpPr>
+          <p:nvPr>
+            <p:ph idx="1"/>
+          </p:nvPr>
+        </p:nvSpPr>
+        <p:spPr/>
+        <p:txBody>
+          <a:bodyPr>
+            <a:normAutofit/>
+          </a:bodyPr>
+          <a:lstStyle/>
+          <a:p>
+            <a:r>
+              <a:rPr lang="en-US" dirty="0"/>
+              <a:t>Discuss problems:</a:t>
+            </a:r>
+          </a:p>
+          <a:p>
+            <a:pPr lvl="1"/>
+            <a:r>
+              <a:rPr lang="en-US" dirty="0"/>
+              <a:t>Behind on documentation</a:t>
+            </a:r>
+          </a:p>
+          <a:p>
+            <a:pPr lvl="1"/>
+            <a:r>
+              <a:rPr lang="en-US" dirty="0"/>
+              <a:t>MVS is not up to date or specific enough</a:t>
+            </a:r>
+          </a:p>
+          <a:p>
+            <a:pPr lvl="1"/>
+            <a:r>
+              <a:rPr lang="en-US" dirty="0"/>
+              <a:t>Need to learn how to do unit testing and then write tests</a:t>
+            </a:r>
+          </a:p>
+          <a:p>
+            <a:pPr lvl="1"/>
+            <a:r>
+              <a:rPr lang="en-US" dirty="0"/>
+              <a:t>Code review</a:t>
+            </a:r>
+          </a:p>
+          <a:p>
+            <a:pPr lvl="1"/>
+            <a:r>
+              <a:rPr lang="en-US" dirty="0"/>
+              <a:t>Only completed two standups</a:t>
+            </a:r>
+          </a:p>
+          <a:p>
+            <a:r>
+              <a:rPr lang="en-US" dirty="0"/>
+              <a:t>Mostly finished the table component</a:t>
+            </a:r>
+          </a:p>
+          <a:p>
+            <a:r>
+              <a:rPr lang="en-US" dirty="0"/>
+              <a:t>Started looking into unit testing with React Testing Library and </a:t>
+            </a:r>
+            <a:r>
+              <a:rPr lang="en-US" dirty="0" err="1"/>
+              <a:t>vitest</a:t>
+            </a:r>
+            <a:endParaRPr lang="en-US" dirty="0"/>
+          </a:p>
+        </p:txBody>
+      </p:sp>
+    </p:spTree>
+    <p:extLst>
+      <p:ext uri="{BB962C8B-B14F-4D97-AF65-F5344CB8AC3E}">
+        <p14:creationId xmlns:p14="http://schemas.microsoft.com/office/powerpoint/2010/main" val="35885094"/>
+      </p:ext>
+    </p:extLst>
+  </p:cSld>
+  <p:clrMapOvr>
+    <a:masterClrMapping/>
+  </p:clrMapOvr>
+</p:sld>
+</file>
+
+<file path=ppt/slides/slide13.xml><?xml version="1.0" encoding="utf-8"?>
+<p:sld xmlns:a="http://schemas.openxmlformats.org/drawingml/2006/main" xmlns:r="http://schemas.openxmlformats.org/officeDocument/2006/relationships" xmlns:p="http://schemas.openxmlformats.org/presentationml/2006/main">
+  <p:cSld>
+    <p:spTree>
+      <p:nvGrpSpPr>
+        <p:cNvPr id="1" name=""/>
+        <p:cNvGrpSpPr/>
+        <p:nvPr/>
+      </p:nvGrpSpPr>
+      <p:grpSpPr>
+        <a:xfrm>
+          <a:off x="0" y="0"/>
+          <a:ext cx="0" cy="0"/>
+          <a:chOff x="0" y="0"/>
+          <a:chExt cx="0" cy="0"/>
+        </a:xfrm>
+      </p:grpSpPr>
+      <p:sp>
+        <p:nvSpPr>
+          <p:cNvPr id="2" name="Title 1">
+            <a:extLst>
+              <a:ext uri="{FF2B5EF4-FFF2-40B4-BE49-F238E27FC236}">
+                <a16:creationId xmlns:a16="http://schemas.microsoft.com/office/drawing/2014/main" id="{72DE1B59-9BF3-D732-F33A-AF693C402BC0}"/>
+              </a:ext>
+            </a:extLst>
+          </p:cNvPr>
+          <p:cNvSpPr>
+            <a:spLocks noGrp="1"/>
+          </p:cNvSpPr>
+          <p:nvPr>
+            <p:ph type="title"/>
+          </p:nvPr>
+        </p:nvSpPr>
+        <p:spPr/>
+        <p:txBody>
+          <a:bodyPr/>
+          <a:lstStyle/>
+          <a:p>
+            <a:r>
+              <a:rPr lang="en-US" dirty="0"/>
+              <a:t>Timeline</a:t>
+            </a:r>
+          </a:p>
+        </p:txBody>
+      </p:sp>
+      <p:graphicFrame>
+        <p:nvGraphicFramePr>
+          <p:cNvPr id="4" name="Chart 3">
+            <a:extLst>
+              <a:ext uri="{FF2B5EF4-FFF2-40B4-BE49-F238E27FC236}">
+                <a16:creationId xmlns:a16="http://schemas.microsoft.com/office/drawing/2014/main" id="{4C50E79F-1566-45D7-ACD8-7EAF34594393}"/>
+              </a:ext>
+            </a:extLst>
+          </p:cNvPr>
+          <p:cNvGraphicFramePr>
+            <a:graphicFrameLocks/>
+          </p:cNvGraphicFramePr>
+          <p:nvPr>
+            <p:extLst>
+              <p:ext uri="{D42A27DB-BD31-4B8C-83A1-F6EECF244321}">
+                <p14:modId xmlns:p14="http://schemas.microsoft.com/office/powerpoint/2010/main" val="2458413772"/>
+              </p:ext>
+            </p:extLst>
+          </p:nvPr>
+        </p:nvGraphicFramePr>
+        <p:xfrm>
+          <a:off x="401279" y="1334666"/>
+          <a:ext cx="11456424" cy="5311940"/>
+        </p:xfrm>
+        <a:graphic>
+          <a:graphicData uri="http://schemas.openxmlformats.org/drawingml/2006/chart">
+            <c:chart xmlns:c="http://schemas.openxmlformats.org/drawingml/2006/chart" xmlns:r="http://schemas.openxmlformats.org/officeDocument/2006/relationships" r:id="rId2"/>
+          </a:graphicData>
+        </a:graphic>
+      </p:graphicFrame>
+      <p:pic>
+        <p:nvPicPr>
+          <p:cNvPr id="5" name="Picture 4">
+            <a:extLst>
+              <a:ext uri="{FF2B5EF4-FFF2-40B4-BE49-F238E27FC236}">
+                <a16:creationId xmlns:a16="http://schemas.microsoft.com/office/drawing/2014/main" id="{58B91F90-E20A-D5C5-17F8-604D87464E12}"/>
+              </a:ext>
+            </a:extLst>
+          </p:cNvPr>
+          <p:cNvPicPr>
+            <a:picLocks noChangeAspect="1"/>
+          </p:cNvPicPr>
+          <p:nvPr/>
+        </p:nvPicPr>
+        <p:blipFill>
+          <a:blip r:embed="rId3">
+            <a:extLst>
+              <a:ext uri="{28A0092B-C50C-407E-A947-70E740481C1C}">
+                <a14:useLocalDpi xmlns:a14="http://schemas.microsoft.com/office/drawing/2010/main" val="0"/>
+              </a:ext>
+            </a:extLst>
+          </a:blip>
+          <a:stretch>
+            <a:fillRect/>
+          </a:stretch>
+        </p:blipFill>
+        <p:spPr>
+          <a:xfrm>
+            <a:off x="3536335" y="2047414"/>
+            <a:ext cx="313813" cy="313813"/>
+          </a:xfrm>
+          <a:prstGeom prst="rect">
+            <a:avLst/>
+          </a:prstGeom>
+        </p:spPr>
+      </p:pic>
+      <p:pic>
+        <p:nvPicPr>
+          <p:cNvPr id="6" name="Picture 5">
+            <a:extLst>
+              <a:ext uri="{FF2B5EF4-FFF2-40B4-BE49-F238E27FC236}">
+                <a16:creationId xmlns:a16="http://schemas.microsoft.com/office/drawing/2014/main" id="{66A6C220-8F33-D852-00E6-C9B56E44FC69}"/>
+              </a:ext>
+            </a:extLst>
+          </p:cNvPr>
+          <p:cNvPicPr>
+            <a:picLocks noChangeAspect="1"/>
+          </p:cNvPicPr>
+          <p:nvPr/>
+        </p:nvPicPr>
+        <p:blipFill>
+          <a:blip r:embed="rId3">
+            <a:extLst>
+              <a:ext uri="{28A0092B-C50C-407E-A947-70E740481C1C}">
+                <a14:useLocalDpi xmlns:a14="http://schemas.microsoft.com/office/drawing/2010/main" val="0"/>
+              </a:ext>
+            </a:extLst>
+          </a:blip>
+          <a:stretch>
+            <a:fillRect/>
+          </a:stretch>
+        </p:blipFill>
+        <p:spPr>
+          <a:xfrm>
+            <a:off x="4637547" y="2843827"/>
+            <a:ext cx="313813" cy="313813"/>
+          </a:xfrm>
+          <a:prstGeom prst="rect">
+            <a:avLst/>
+          </a:prstGeom>
+        </p:spPr>
+      </p:pic>
+      <p:pic>
+        <p:nvPicPr>
+          <p:cNvPr id="7" name="Picture 6">
+            <a:extLst>
+              <a:ext uri="{FF2B5EF4-FFF2-40B4-BE49-F238E27FC236}">
+                <a16:creationId xmlns:a16="http://schemas.microsoft.com/office/drawing/2014/main" id="{13E649EE-E6E3-6330-01A2-7CDD3D457B00}"/>
+              </a:ext>
+            </a:extLst>
+          </p:cNvPr>
+          <p:cNvPicPr>
+            <a:picLocks noChangeAspect="1"/>
+          </p:cNvPicPr>
+          <p:nvPr/>
+        </p:nvPicPr>
+        <p:blipFill>
+          <a:blip r:embed="rId3">
+            <a:extLst>
+              <a:ext uri="{28A0092B-C50C-407E-A947-70E740481C1C}">
+                <a14:useLocalDpi xmlns:a14="http://schemas.microsoft.com/office/drawing/2010/main" val="0"/>
+              </a:ext>
+            </a:extLst>
+          </a:blip>
+          <a:stretch>
+            <a:fillRect/>
+          </a:stretch>
+        </p:blipFill>
+        <p:spPr>
+          <a:xfrm>
+            <a:off x="5815678" y="3697927"/>
+            <a:ext cx="313813" cy="313813"/>
+          </a:xfrm>
+          <a:prstGeom prst="rect">
+            <a:avLst/>
+          </a:prstGeom>
+        </p:spPr>
+      </p:pic>
+      <p:pic>
+        <p:nvPicPr>
+          <p:cNvPr id="8" name="Picture 7">
+            <a:extLst>
+              <a:ext uri="{FF2B5EF4-FFF2-40B4-BE49-F238E27FC236}">
+                <a16:creationId xmlns:a16="http://schemas.microsoft.com/office/drawing/2014/main" id="{484EE602-6D59-5E4F-BA7A-26D7BC29D821}"/>
+              </a:ext>
+            </a:extLst>
+          </p:cNvPr>
+          <p:cNvPicPr>
+            <a:picLocks noChangeAspect="1"/>
+          </p:cNvPicPr>
+          <p:nvPr/>
+        </p:nvPicPr>
+        <p:blipFill>
+          <a:blip r:embed="rId3">
+            <a:extLst>
+              <a:ext uri="{28A0092B-C50C-407E-A947-70E740481C1C}">
+                <a14:useLocalDpi xmlns:a14="http://schemas.microsoft.com/office/drawing/2010/main" val="0"/>
+              </a:ext>
+            </a:extLst>
+          </a:blip>
+          <a:stretch>
+            <a:fillRect/>
+          </a:stretch>
+        </p:blipFill>
+        <p:spPr>
+          <a:xfrm>
+            <a:off x="6987457" y="4289169"/>
+            <a:ext cx="313813" cy="313813"/>
+          </a:xfrm>
+          <a:prstGeom prst="rect">
+            <a:avLst/>
+          </a:prstGeom>
+        </p:spPr>
+      </p:pic>
+      <p:pic>
+        <p:nvPicPr>
+          <p:cNvPr id="9" name="Picture 8">
+            <a:extLst>
+              <a:ext uri="{FF2B5EF4-FFF2-40B4-BE49-F238E27FC236}">
+                <a16:creationId xmlns:a16="http://schemas.microsoft.com/office/drawing/2014/main" id="{60D39147-6D10-4A4C-A952-10A87F7228B2}"/>
+              </a:ext>
+            </a:extLst>
+          </p:cNvPr>
+          <p:cNvPicPr>
+            <a:picLocks noChangeAspect="1"/>
+          </p:cNvPicPr>
+          <p:nvPr/>
+        </p:nvPicPr>
+        <p:blipFill>
+          <a:blip r:embed="rId3">
+            <a:extLst>
+              <a:ext uri="{28A0092B-C50C-407E-A947-70E740481C1C}">
+                <a14:useLocalDpi xmlns:a14="http://schemas.microsoft.com/office/drawing/2010/main" val="0"/>
+              </a:ext>
+            </a:extLst>
+          </a:blip>
+          <a:stretch>
+            <a:fillRect/>
+          </a:stretch>
+        </p:blipFill>
+        <p:spPr>
+          <a:xfrm>
+            <a:off x="8186992" y="4997091"/>
+            <a:ext cx="313813" cy="313813"/>
+          </a:xfrm>
+          <a:prstGeom prst="rect">
+            <a:avLst/>
+          </a:prstGeom>
+        </p:spPr>
+      </p:pic>
+      <p:pic>
+        <p:nvPicPr>
+          <p:cNvPr id="10" name="Picture 9">
+            <a:extLst>
+              <a:ext uri="{FF2B5EF4-FFF2-40B4-BE49-F238E27FC236}">
+                <a16:creationId xmlns:a16="http://schemas.microsoft.com/office/drawing/2014/main" id="{4FE15601-D342-32B2-DA50-4361864B8602}"/>
+              </a:ext>
+            </a:extLst>
+          </p:cNvPr>
+          <p:cNvPicPr>
+            <a:picLocks noChangeAspect="1"/>
+          </p:cNvPicPr>
+          <p:nvPr/>
+        </p:nvPicPr>
+        <p:blipFill>
+          <a:blip r:embed="rId3">
+            <a:extLst>
+              <a:ext uri="{28A0092B-C50C-407E-A947-70E740481C1C}">
+                <a14:useLocalDpi xmlns:a14="http://schemas.microsoft.com/office/drawing/2010/main" val="0"/>
+              </a:ext>
+            </a:extLst>
+          </a:blip>
+          <a:stretch>
+            <a:fillRect/>
+          </a:stretch>
+        </p:blipFill>
+        <p:spPr>
+          <a:xfrm>
+            <a:off x="10487741" y="5773840"/>
+            <a:ext cx="313813" cy="313813"/>
+          </a:xfrm>
+          <a:prstGeom prst="rect">
+            <a:avLst/>
+          </a:prstGeom>
+        </p:spPr>
+      </p:pic>
+      <p:pic>
+        <p:nvPicPr>
+          <p:cNvPr id="11" name="Picture 10">
+            <a:extLst>
+              <a:ext uri="{FF2B5EF4-FFF2-40B4-BE49-F238E27FC236}">
+                <a16:creationId xmlns:a16="http://schemas.microsoft.com/office/drawing/2014/main" id="{F48E0BE4-77AA-D365-8CC3-6E3FDEB887CF}"/>
+              </a:ext>
+            </a:extLst>
+          </p:cNvPr>
+          <p:cNvPicPr>
+            <a:picLocks noChangeAspect="1"/>
+          </p:cNvPicPr>
+          <p:nvPr/>
+        </p:nvPicPr>
+        <p:blipFill>
+          <a:blip r:embed="rId3">
+            <a:extLst>
+              <a:ext uri="{28A0092B-C50C-407E-A947-70E740481C1C}">
+                <a14:useLocalDpi xmlns:a14="http://schemas.microsoft.com/office/drawing/2010/main" val="0"/>
+              </a:ext>
+            </a:extLst>
+          </a:blip>
+          <a:stretch>
+            <a:fillRect/>
+          </a:stretch>
+        </p:blipFill>
+        <p:spPr>
+          <a:xfrm>
+            <a:off x="9396361" y="5310904"/>
+            <a:ext cx="313813" cy="313813"/>
+          </a:xfrm>
+          <a:prstGeom prst="rect">
+            <a:avLst/>
+          </a:prstGeom>
+        </p:spPr>
+      </p:pic>
+      <p:pic>
+        <p:nvPicPr>
+          <p:cNvPr id="12" name="Picture 11" descr="A red banner with white text">
+            <a:extLst>
+              <a:ext uri="{FF2B5EF4-FFF2-40B4-BE49-F238E27FC236}">
+                <a16:creationId xmlns:a16="http://schemas.microsoft.com/office/drawing/2014/main" id="{99E36D90-C1EB-3017-282D-5F26FD7896EF}"/>
+              </a:ext>
+            </a:extLst>
+          </p:cNvPr>
+          <p:cNvPicPr>
+            <a:picLocks noChangeAspect="1"/>
+          </p:cNvPicPr>
+          <p:nvPr/>
+        </p:nvPicPr>
+        <p:blipFill>
+          <a:blip r:embed="rId4">
+            <a:extLst>
+              <a:ext uri="{28A0092B-C50C-407E-A947-70E740481C1C}">
+                <a14:useLocalDpi xmlns:a14="http://schemas.microsoft.com/office/drawing/2010/main" val="0"/>
+              </a:ext>
+            </a:extLst>
+          </a:blip>
+          <a:stretch>
+            <a:fillRect/>
+          </a:stretch>
+        </p:blipFill>
+        <p:spPr>
+          <a:xfrm>
+            <a:off x="10935109" y="5670248"/>
+            <a:ext cx="636639" cy="520995"/>
+          </a:xfrm>
+          <a:prstGeom prst="rect">
+            <a:avLst/>
+          </a:prstGeom>
+        </p:spPr>
+      </p:pic>
+    </p:spTree>
+    <p:extLst>
+      <p:ext uri="{BB962C8B-B14F-4D97-AF65-F5344CB8AC3E}">
+        <p14:creationId xmlns:p14="http://schemas.microsoft.com/office/powerpoint/2010/main" val="3606335266"/>
+      </p:ext>
+    </p:extLst>
+  </p:cSld>
+  <p:clrMapOvr>
+    <a:masterClrMapping/>
+  </p:clrMapOvr>
+</p:sld>
+</file>
+
+<file path=ppt/slides/slide14.xml><?xml version="1.0" encoding="utf-8"?>
+<p:sld xmlns:a="http://schemas.openxmlformats.org/drawingml/2006/main" xmlns:r="http://schemas.openxmlformats.org/officeDocument/2006/relationships" xmlns:p="http://schemas.openxmlformats.org/presentationml/2006/main">
+  <p:cSld>
+    <p:spTree>
+      <p:nvGrpSpPr>
+        <p:cNvPr id="1" name=""/>
+        <p:cNvGrpSpPr/>
+        <p:nvPr/>
+      </p:nvGrpSpPr>
+      <p:grpSpPr>
+        <a:xfrm>
+          <a:off x="0" y="0"/>
+          <a:ext cx="0" cy="0"/>
+          <a:chOff x="0" y="0"/>
+          <a:chExt cx="0" cy="0"/>
+        </a:xfrm>
+      </p:grpSpPr>
+      <p:sp>
+        <p:nvSpPr>
+          <p:cNvPr id="2" name="Title 1">
+            <a:extLst>
+              <a:ext uri="{FF2B5EF4-FFF2-40B4-BE49-F238E27FC236}">
+                <a16:creationId xmlns:a16="http://schemas.microsoft.com/office/drawing/2014/main" id="{F7520C13-38C5-AA74-807C-0B9415D302AB}"/>
+              </a:ext>
+            </a:extLst>
+          </p:cNvPr>
+          <p:cNvSpPr>
+            <a:spLocks noGrp="1"/>
+          </p:cNvSpPr>
+          <p:nvPr>
+            <p:ph type="title"/>
+          </p:nvPr>
+        </p:nvSpPr>
+        <p:spPr/>
+        <p:txBody>
+          <a:bodyPr/>
+          <a:lstStyle/>
+          <a:p>
+            <a:r>
+              <a:rPr lang="en-US" dirty="0"/>
+              <a:t>Previous Progress</a:t>
+            </a:r>
+          </a:p>
+        </p:txBody>
+      </p:sp>
+      <p:sp>
+        <p:nvSpPr>
+          <p:cNvPr id="3" name="Content Placeholder 2">
+            <a:extLst>
+              <a:ext uri="{FF2B5EF4-FFF2-40B4-BE49-F238E27FC236}">
+                <a16:creationId xmlns:a16="http://schemas.microsoft.com/office/drawing/2014/main" id="{C59125B7-9EFD-F50B-714F-0952C4CF69FC}"/>
+              </a:ext>
+            </a:extLst>
+          </p:cNvPr>
+          <p:cNvSpPr>
+            <a:spLocks noGrp="1"/>
+          </p:cNvSpPr>
+          <p:nvPr>
+            <p:ph idx="1"/>
+          </p:nvPr>
+        </p:nvSpPr>
+        <p:spPr/>
+        <p:txBody>
+          <a:bodyPr/>
+          <a:lstStyle/>
+          <a:p>
+            <a:r>
+              <a:rPr lang="en-US" dirty="0"/>
+              <a:t>Finished data entry table draft</a:t>
+            </a:r>
+          </a:p>
+          <a:p>
+            <a:pPr lvl="1"/>
+            <a:r>
+              <a:rPr lang="en-US" dirty="0"/>
+              <a:t>Used context API</a:t>
+            </a:r>
+          </a:p>
+          <a:p>
+            <a:pPr lvl="1"/>
+            <a:r>
+              <a:rPr lang="en-US" dirty="0"/>
+              <a:t>Somewhat avoided using ChatGPT</a:t>
+            </a:r>
+          </a:p>
+          <a:p>
+            <a:r>
+              <a:rPr lang="en-US" dirty="0"/>
+              <a:t>Set up to start unit testing</a:t>
+            </a:r>
+          </a:p>
+          <a:p>
+            <a:r>
+              <a:rPr lang="en-US" dirty="0"/>
+              <a:t>Briefly refactorized code (broke code down into distinct components)</a:t>
+            </a:r>
+          </a:p>
+        </p:txBody>
+      </p:sp>
+    </p:spTree>
+    <p:extLst>
+      <p:ext uri="{BB962C8B-B14F-4D97-AF65-F5344CB8AC3E}">
+        <p14:creationId xmlns:p14="http://schemas.microsoft.com/office/powerpoint/2010/main" val="3729863807"/>
+      </p:ext>
+    </p:extLst>
+  </p:cSld>
+  <p:clrMapOvr>
+    <a:masterClrMapping/>
+  </p:clrMapOvr>
+</p:sld>
+</file>
+
+<file path=ppt/slides/slide15.xml><?xml version="1.0" encoding="utf-8"?>
+<p:sld xmlns:a="http://schemas.openxmlformats.org/drawingml/2006/main" xmlns:r="http://schemas.openxmlformats.org/officeDocument/2006/relationships" xmlns:p="http://schemas.openxmlformats.org/presentationml/2006/main">
+  <p:cSld>
+    <p:spTree>
+      <p:nvGrpSpPr>
+        <p:cNvPr id="1" name=""/>
+        <p:cNvGrpSpPr/>
+        <p:nvPr/>
+      </p:nvGrpSpPr>
+      <p:grpSpPr>
+        <a:xfrm>
+          <a:off x="0" y="0"/>
+          <a:ext cx="0" cy="0"/>
+          <a:chOff x="0" y="0"/>
+          <a:chExt cx="0" cy="0"/>
+        </a:xfrm>
+      </p:grpSpPr>
+      <p:sp>
+        <p:nvSpPr>
+          <p:cNvPr id="2" name="Title 1">
+            <a:extLst>
+              <a:ext uri="{FF2B5EF4-FFF2-40B4-BE49-F238E27FC236}">
+                <a16:creationId xmlns:a16="http://schemas.microsoft.com/office/drawing/2014/main" id="{8470CE04-6E8B-DA4E-6E3F-01F799FC63AE}"/>
+              </a:ext>
+            </a:extLst>
+          </p:cNvPr>
+          <p:cNvSpPr>
+            <a:spLocks noGrp="1"/>
+          </p:cNvSpPr>
+          <p:nvPr>
+            <p:ph type="title"/>
+          </p:nvPr>
+        </p:nvSpPr>
+        <p:spPr/>
+        <p:txBody>
+          <a:bodyPr/>
+          <a:lstStyle/>
+          <a:p>
+            <a:r>
+              <a:rPr lang="en-US" dirty="0"/>
+              <a:t>Previous Progress</a:t>
+            </a:r>
+          </a:p>
+        </p:txBody>
+      </p:sp>
+      <p:pic>
+        <p:nvPicPr>
+          <p:cNvPr id="5" name="Content Placeholder 4" descr="A screen shot of a computer">
+            <a:extLst>
+              <a:ext uri="{FF2B5EF4-FFF2-40B4-BE49-F238E27FC236}">
+                <a16:creationId xmlns:a16="http://schemas.microsoft.com/office/drawing/2014/main" id="{B213C986-676E-9578-BC8B-EC2E362433CD}"/>
+              </a:ext>
+            </a:extLst>
+          </p:cNvPr>
+          <p:cNvPicPr>
+            <a:picLocks noGrp="1" noChangeAspect="1"/>
+          </p:cNvPicPr>
+          <p:nvPr>
+            <p:ph idx="1"/>
+          </p:nvPr>
+        </p:nvPicPr>
+        <p:blipFill>
+          <a:blip r:embed="rId2">
+            <a:extLst>
+              <a:ext uri="{28A0092B-C50C-407E-A947-70E740481C1C}">
+                <a14:useLocalDpi xmlns:a14="http://schemas.microsoft.com/office/drawing/2010/main" val="0"/>
+              </a:ext>
+            </a:extLst>
+          </a:blip>
+          <a:stretch>
+            <a:fillRect/>
+          </a:stretch>
+        </p:blipFill>
+        <p:spPr>
+          <a:xfrm>
+            <a:off x="365743" y="1557460"/>
+            <a:ext cx="11274585" cy="4361560"/>
+          </a:xfrm>
+        </p:spPr>
+      </p:pic>
+    </p:spTree>
+    <p:extLst>
+      <p:ext uri="{BB962C8B-B14F-4D97-AF65-F5344CB8AC3E}">
+        <p14:creationId xmlns:p14="http://schemas.microsoft.com/office/powerpoint/2010/main" val="3385965748"/>
+      </p:ext>
+    </p:extLst>
+  </p:cSld>
+  <p:clrMapOvr>
+    <a:masterClrMapping/>
+  </p:clrMapOvr>
+</p:sld>
+</file>
+
+<file path=ppt/slides/slide16.xml><?xml version="1.0" encoding="utf-8"?>
+<p:sld xmlns:a="http://schemas.openxmlformats.org/drawingml/2006/main" xmlns:r="http://schemas.openxmlformats.org/officeDocument/2006/relationships" xmlns:p="http://schemas.openxmlformats.org/presentationml/2006/main">
+  <p:cSld>
+    <p:spTree>
+      <p:nvGrpSpPr>
+        <p:cNvPr id="1" name=""/>
+        <p:cNvGrpSpPr/>
+        <p:nvPr/>
+      </p:nvGrpSpPr>
+      <p:grpSpPr>
+        <a:xfrm>
+          <a:off x="0" y="0"/>
+          <a:ext cx="0" cy="0"/>
+          <a:chOff x="0" y="0"/>
+          <a:chExt cx="0" cy="0"/>
+        </a:xfrm>
+      </p:grpSpPr>
+      <p:sp>
+        <p:nvSpPr>
+          <p:cNvPr id="2" name="Title 1">
+            <a:extLst>
+              <a:ext uri="{FF2B5EF4-FFF2-40B4-BE49-F238E27FC236}">
+                <a16:creationId xmlns:a16="http://schemas.microsoft.com/office/drawing/2014/main" id="{3F517AED-4C6C-7B3A-85D3-C1E1FA527F49}"/>
+              </a:ext>
+            </a:extLst>
+          </p:cNvPr>
+          <p:cNvSpPr>
+            <a:spLocks noGrp="1"/>
+          </p:cNvSpPr>
+          <p:nvPr>
+            <p:ph type="title"/>
+          </p:nvPr>
+        </p:nvSpPr>
+        <p:spPr/>
+        <p:txBody>
+          <a:bodyPr/>
+          <a:lstStyle/>
+          <a:p>
+            <a:r>
+              <a:rPr lang="en-US" dirty="0"/>
+              <a:t>Documentation Problems</a:t>
+            </a:r>
+          </a:p>
+        </p:txBody>
+      </p:sp>
+      <p:sp>
+        <p:nvSpPr>
+          <p:cNvPr id="3" name="Content Placeholder 2">
+            <a:extLst>
+              <a:ext uri="{FF2B5EF4-FFF2-40B4-BE49-F238E27FC236}">
+                <a16:creationId xmlns:a16="http://schemas.microsoft.com/office/drawing/2014/main" id="{FE13872B-A17D-B8DB-B51F-925AA1E59A8A}"/>
+              </a:ext>
+            </a:extLst>
+          </p:cNvPr>
+          <p:cNvSpPr>
+            <a:spLocks noGrp="1"/>
+          </p:cNvSpPr>
+          <p:nvPr>
+            <p:ph idx="1"/>
+          </p:nvPr>
+        </p:nvSpPr>
+        <p:spPr>
+          <a:xfrm>
+            <a:off x="838200" y="1445342"/>
+            <a:ext cx="10515600" cy="5270089"/>
+          </a:xfrm>
+        </p:spPr>
+        <p:txBody>
+          <a:bodyPr>
+            <a:normAutofit fontScale="92500" lnSpcReduction="10000"/>
+          </a:bodyPr>
+          <a:lstStyle/>
+          <a:p>
+            <a:r>
+              <a:rPr lang="en-US" dirty="0"/>
+              <a:t>Conversion (</a:t>
+            </a:r>
+            <a:r>
+              <a:rPr lang="en-US" dirty="0" err="1"/>
+              <a:t>file.x</a:t>
+            </a:r>
+            <a:r>
+              <a:rPr lang="en-US" dirty="0"/>
+              <a:t> --&gt; file.md)</a:t>
+            </a:r>
+          </a:p>
+          <a:p>
+            <a:pPr lvl="1"/>
+            <a:r>
+              <a:rPr lang="en-US" dirty="0"/>
+              <a:t>sprint3_standup.pptx</a:t>
+            </a:r>
+          </a:p>
+          <a:p>
+            <a:pPr lvl="1"/>
+            <a:r>
+              <a:rPr lang="en-US" dirty="0"/>
+              <a:t>All files mentioned under here</a:t>
+            </a:r>
+          </a:p>
+          <a:p>
+            <a:r>
+              <a:rPr lang="en-US" dirty="0"/>
+              <a:t>Complete</a:t>
+            </a:r>
+          </a:p>
+          <a:p>
+            <a:pPr lvl="1"/>
+            <a:r>
+              <a:rPr lang="en-US" dirty="0"/>
+              <a:t>Sprint dashboard</a:t>
+            </a:r>
+          </a:p>
+          <a:p>
+            <a:pPr lvl="2"/>
+            <a:r>
+              <a:rPr lang="en-US" dirty="0"/>
+              <a:t>Sprint 2</a:t>
+            </a:r>
+          </a:p>
+          <a:p>
+            <a:pPr lvl="2"/>
+            <a:r>
+              <a:rPr lang="en-US" dirty="0"/>
+              <a:t>Sprint 3</a:t>
+            </a:r>
+          </a:p>
+          <a:p>
+            <a:pPr lvl="2"/>
+            <a:r>
+              <a:rPr lang="en-US" dirty="0"/>
+              <a:t>Sprint 4 (new)</a:t>
+            </a:r>
+          </a:p>
+          <a:p>
+            <a:pPr lvl="1"/>
+            <a:r>
+              <a:rPr lang="en-US" dirty="0"/>
+              <a:t>Backlog</a:t>
+            </a:r>
+          </a:p>
+          <a:p>
+            <a:pPr lvl="2"/>
+            <a:r>
+              <a:rPr lang="en-US" dirty="0"/>
+              <a:t>Intro to react</a:t>
+            </a:r>
+          </a:p>
+          <a:p>
+            <a:pPr lvl="2"/>
+            <a:r>
+              <a:rPr lang="en-US" dirty="0"/>
+              <a:t>Data Entry Table</a:t>
+            </a:r>
+          </a:p>
+          <a:p>
+            <a:pPr lvl="1"/>
+            <a:r>
+              <a:rPr lang="en-US" dirty="0"/>
+              <a:t>Sprint 3 retrospective</a:t>
+            </a:r>
+          </a:p>
+          <a:p>
+            <a:pPr lvl="1"/>
+            <a:r>
+              <a:rPr lang="en-US" dirty="0"/>
+              <a:t>Sprint 3 standups (combine)</a:t>
+            </a:r>
+          </a:p>
+          <a:p>
+            <a:pPr lvl="1"/>
+            <a:r>
+              <a:rPr lang="en-US" dirty="0"/>
+              <a:t>Add relevant documents to the sprint3 folder</a:t>
+            </a:r>
+          </a:p>
+          <a:p>
+            <a:r>
+              <a:rPr lang="en-US" dirty="0"/>
+              <a:t>Revise: MVS</a:t>
+            </a:r>
+          </a:p>
+        </p:txBody>
+      </p:sp>
+    </p:spTree>
+    <p:extLst>
+      <p:ext uri="{BB962C8B-B14F-4D97-AF65-F5344CB8AC3E}">
+        <p14:creationId xmlns:p14="http://schemas.microsoft.com/office/powerpoint/2010/main" val="2130063065"/>
+      </p:ext>
+    </p:extLst>
+  </p:cSld>
+  <p:clrMapOvr>
+    <a:masterClrMapping/>
+  </p:clrMapOvr>
+</p:sld>
+</file>
+
+<file path=ppt/slides/slide17.xml><?xml version="1.0" encoding="utf-8"?>
+<p:sld xmlns:a="http://schemas.openxmlformats.org/drawingml/2006/main" xmlns:r="http://schemas.openxmlformats.org/officeDocument/2006/relationships" xmlns:p="http://schemas.openxmlformats.org/presentationml/2006/main">
+  <p:cSld>
+    <p:spTree>
+      <p:nvGrpSpPr>
+        <p:cNvPr id="1" name=""/>
+        <p:cNvGrpSpPr/>
+        <p:nvPr/>
+      </p:nvGrpSpPr>
+      <p:grpSpPr>
+        <a:xfrm>
+          <a:off x="0" y="0"/>
+          <a:ext cx="0" cy="0"/>
+          <a:chOff x="0" y="0"/>
+          <a:chExt cx="0" cy="0"/>
+        </a:xfrm>
+      </p:grpSpPr>
+      <p:sp>
+        <p:nvSpPr>
+          <p:cNvPr id="2" name="Title 1">
+            <a:extLst>
+              <a:ext uri="{FF2B5EF4-FFF2-40B4-BE49-F238E27FC236}">
+                <a16:creationId xmlns:a16="http://schemas.microsoft.com/office/drawing/2014/main" id="{C1B4E4CF-8956-88DF-8C25-FFF9388FD619}"/>
+              </a:ext>
+            </a:extLst>
+          </p:cNvPr>
+          <p:cNvSpPr>
+            <a:spLocks noGrp="1"/>
+          </p:cNvSpPr>
+          <p:nvPr>
+            <p:ph type="title"/>
+          </p:nvPr>
+        </p:nvSpPr>
+        <p:spPr/>
+        <p:txBody>
+          <a:bodyPr/>
+          <a:lstStyle/>
+          <a:p>
+            <a:r>
+              <a:rPr lang="en-US" dirty="0"/>
+              <a:t>Problems and Blockers – poor </a:t>
+            </a:r>
+            <a:r>
+              <a:rPr lang="en-US" dirty="0" err="1"/>
+              <a:t>mvs</a:t>
+            </a:r>
+            <a:endParaRPr lang="en-US" dirty="0"/>
+          </a:p>
+        </p:txBody>
+      </p:sp>
+      <p:pic>
+        <p:nvPicPr>
+          <p:cNvPr id="5" name="Content Placeholder 4" descr="A screenshot of a computer program&#10;&#10;AI-generated content may be incorrect.">
+            <a:extLst>
+              <a:ext uri="{FF2B5EF4-FFF2-40B4-BE49-F238E27FC236}">
+                <a16:creationId xmlns:a16="http://schemas.microsoft.com/office/drawing/2014/main" id="{F00E5900-6BDF-0856-F1E5-1E81839D0FE3}"/>
+              </a:ext>
+            </a:extLst>
+          </p:cNvPr>
+          <p:cNvPicPr>
+            <a:picLocks noGrp="1" noChangeAspect="1"/>
+          </p:cNvPicPr>
+          <p:nvPr>
+            <p:ph idx="1"/>
+          </p:nvPr>
+        </p:nvPicPr>
+        <p:blipFill>
+          <a:blip r:embed="rId2">
+            <a:extLst>
+              <a:ext uri="{28A0092B-C50C-407E-A947-70E740481C1C}">
+                <a14:useLocalDpi xmlns:a14="http://schemas.microsoft.com/office/drawing/2010/main" val="0"/>
+              </a:ext>
+            </a:extLst>
+          </a:blip>
+          <a:stretch>
+            <a:fillRect/>
+          </a:stretch>
+        </p:blipFill>
+        <p:spPr>
+          <a:xfrm>
+            <a:off x="-130081" y="1690688"/>
+            <a:ext cx="6035563" cy="3825572"/>
+          </a:xfrm>
+        </p:spPr>
+      </p:pic>
+      <p:pic>
+        <p:nvPicPr>
+          <p:cNvPr id="7" name="Picture 6" descr="A screenshot of a computer program&#10;&#10;AI-generated content may be incorrect.">
+            <a:extLst>
+              <a:ext uri="{FF2B5EF4-FFF2-40B4-BE49-F238E27FC236}">
+                <a16:creationId xmlns:a16="http://schemas.microsoft.com/office/drawing/2014/main" id="{CED82026-DE22-06DE-176D-6CF4CA084590}"/>
+              </a:ext>
+            </a:extLst>
+          </p:cNvPr>
+          <p:cNvPicPr>
+            <a:picLocks noChangeAspect="1"/>
+          </p:cNvPicPr>
+          <p:nvPr/>
+        </p:nvPicPr>
+        <p:blipFill>
+          <a:blip r:embed="rId3">
+            <a:extLst>
+              <a:ext uri="{28A0092B-C50C-407E-A947-70E740481C1C}">
+                <a14:useLocalDpi xmlns:a14="http://schemas.microsoft.com/office/drawing/2010/main" val="0"/>
+              </a:ext>
+            </a:extLst>
+          </a:blip>
+          <a:stretch>
+            <a:fillRect/>
+          </a:stretch>
+        </p:blipFill>
+        <p:spPr>
+          <a:xfrm>
+            <a:off x="6013638" y="1690688"/>
+            <a:ext cx="6090612" cy="3284435"/>
+          </a:xfrm>
+          <a:prstGeom prst="rect">
+            <a:avLst/>
+          </a:prstGeom>
+        </p:spPr>
+      </p:pic>
+    </p:spTree>
+    <p:extLst>
+      <p:ext uri="{BB962C8B-B14F-4D97-AF65-F5344CB8AC3E}">
+        <p14:creationId xmlns:p14="http://schemas.microsoft.com/office/powerpoint/2010/main" val="652047141"/>
+      </p:ext>
+    </p:extLst>
+  </p:cSld>
+  <p:clrMapOvr>
+    <a:masterClrMapping/>
+  </p:clrMapOvr>
+</p:sld>
+</file>
+
+<file path=ppt/slides/slide18.xml><?xml version="1.0" encoding="utf-8"?>
+<p:sld xmlns:a="http://schemas.openxmlformats.org/drawingml/2006/main" xmlns:r="http://schemas.openxmlformats.org/officeDocument/2006/relationships" xmlns:p="http://schemas.openxmlformats.org/presentationml/2006/main">
+  <p:cSld>
+    <p:spTree>
+      <p:nvGrpSpPr>
+        <p:cNvPr id="1" name=""/>
+        <p:cNvGrpSpPr/>
+        <p:nvPr/>
+      </p:nvGrpSpPr>
+      <p:grpSpPr>
+        <a:xfrm>
+          <a:off x="0" y="0"/>
+          <a:ext cx="0" cy="0"/>
+          <a:chOff x="0" y="0"/>
+          <a:chExt cx="0" cy="0"/>
+        </a:xfrm>
+      </p:grpSpPr>
+      <p:sp>
+        <p:nvSpPr>
+          <p:cNvPr id="2" name="Title 1">
+            <a:extLst>
+              <a:ext uri="{FF2B5EF4-FFF2-40B4-BE49-F238E27FC236}">
+                <a16:creationId xmlns:a16="http://schemas.microsoft.com/office/drawing/2014/main" id="{13FA11A4-BD56-6A00-E8F4-57909BDDEE35}"/>
+              </a:ext>
+            </a:extLst>
+          </p:cNvPr>
+          <p:cNvSpPr>
+            <a:spLocks noGrp="1"/>
+          </p:cNvSpPr>
+          <p:nvPr>
+            <p:ph type="title"/>
+          </p:nvPr>
+        </p:nvSpPr>
+        <p:spPr/>
+        <p:txBody>
+          <a:bodyPr/>
+          <a:lstStyle/>
+          <a:p>
+            <a:r>
+              <a:rPr lang="en-US" dirty="0"/>
+              <a:t>Problems and Blockers – poor documentation</a:t>
+            </a:r>
+          </a:p>
+        </p:txBody>
+      </p:sp>
+      <p:pic>
+        <p:nvPicPr>
+          <p:cNvPr id="5" name="Content Placeholder 4" descr="A screenshot of a computer&#10;&#10;AI-generated content may be incorrect.">
+            <a:extLst>
+              <a:ext uri="{FF2B5EF4-FFF2-40B4-BE49-F238E27FC236}">
+                <a16:creationId xmlns:a16="http://schemas.microsoft.com/office/drawing/2014/main" id="{C5DD4541-E7D3-728F-7BCF-DE2A53E6FBC6}"/>
+              </a:ext>
+            </a:extLst>
+          </p:cNvPr>
+          <p:cNvPicPr>
+            <a:picLocks noGrp="1" noChangeAspect="1"/>
+          </p:cNvPicPr>
+          <p:nvPr>
+            <p:ph idx="1"/>
+          </p:nvPr>
+        </p:nvPicPr>
+        <p:blipFill>
+          <a:blip r:embed="rId2">
+            <a:extLst>
+              <a:ext uri="{28A0092B-C50C-407E-A947-70E740481C1C}">
+                <a14:useLocalDpi xmlns:a14="http://schemas.microsoft.com/office/drawing/2010/main" val="0"/>
+              </a:ext>
+            </a:extLst>
+          </a:blip>
+          <a:stretch>
+            <a:fillRect/>
+          </a:stretch>
+        </p:blipFill>
+        <p:spPr>
+          <a:xfrm>
+            <a:off x="1046428" y="1451999"/>
+            <a:ext cx="2709495" cy="5279064"/>
+          </a:xfrm>
+        </p:spPr>
+      </p:pic>
+      <p:pic>
+        <p:nvPicPr>
+          <p:cNvPr id="7" name="Picture 6" descr="A screenshot of a computer&#10;&#10;AI-generated content may be incorrect.">
+            <a:extLst>
+              <a:ext uri="{FF2B5EF4-FFF2-40B4-BE49-F238E27FC236}">
+                <a16:creationId xmlns:a16="http://schemas.microsoft.com/office/drawing/2014/main" id="{9A681385-1525-EE3F-64F5-20D9AE11717E}"/>
+              </a:ext>
+            </a:extLst>
+          </p:cNvPr>
+          <p:cNvPicPr>
+            <a:picLocks noChangeAspect="1"/>
+          </p:cNvPicPr>
+          <p:nvPr/>
+        </p:nvPicPr>
+        <p:blipFill>
+          <a:blip r:embed="rId3">
+            <a:extLst>
+              <a:ext uri="{28A0092B-C50C-407E-A947-70E740481C1C}">
+                <a14:useLocalDpi xmlns:a14="http://schemas.microsoft.com/office/drawing/2010/main" val="0"/>
+              </a:ext>
+            </a:extLst>
+          </a:blip>
+          <a:stretch>
+            <a:fillRect/>
+          </a:stretch>
+        </p:blipFill>
+        <p:spPr>
+          <a:xfrm>
+            <a:off x="4270074" y="1433484"/>
+            <a:ext cx="3038222" cy="5408909"/>
+          </a:xfrm>
+          <a:prstGeom prst="rect">
+            <a:avLst/>
+          </a:prstGeom>
+        </p:spPr>
+      </p:pic>
+    </p:spTree>
+    <p:extLst>
+      <p:ext uri="{BB962C8B-B14F-4D97-AF65-F5344CB8AC3E}">
+        <p14:creationId xmlns:p14="http://schemas.microsoft.com/office/powerpoint/2010/main" val="2863268868"/>
+      </p:ext>
+    </p:extLst>
+  </p:cSld>
+  <p:clrMapOvr>
+    <a:masterClrMapping/>
+  </p:clrMapOvr>
+</p:sld>
+</file>
+
+<file path=ppt/slides/slide19.xml><?xml version="1.0" encoding="utf-8"?>
+<p:sld xmlns:a="http://schemas.openxmlformats.org/drawingml/2006/main" xmlns:r="http://schemas.openxmlformats.org/officeDocument/2006/relationships" xmlns:p="http://schemas.openxmlformats.org/presentationml/2006/main">
+  <p:cSld>
+    <p:spTree>
+      <p:nvGrpSpPr>
+        <p:cNvPr id="1" name=""/>
+        <p:cNvGrpSpPr/>
+        <p:nvPr/>
+      </p:nvGrpSpPr>
+      <p:grpSpPr>
+        <a:xfrm>
+          <a:off x="0" y="0"/>
+          <a:ext cx="0" cy="0"/>
+          <a:chOff x="0" y="0"/>
+          <a:chExt cx="0" cy="0"/>
+        </a:xfrm>
+      </p:grpSpPr>
+      <p:sp>
+        <p:nvSpPr>
+          <p:cNvPr id="2" name="Title 1">
+            <a:extLst>
+              <a:ext uri="{FF2B5EF4-FFF2-40B4-BE49-F238E27FC236}">
+                <a16:creationId xmlns:a16="http://schemas.microsoft.com/office/drawing/2014/main" id="{BEB9138C-EF81-5417-D9BC-048DED2FEE17}"/>
+              </a:ext>
+            </a:extLst>
+          </p:cNvPr>
+          <p:cNvSpPr>
+            <a:spLocks noGrp="1"/>
+          </p:cNvSpPr>
+          <p:nvPr>
+            <p:ph type="title"/>
+          </p:nvPr>
+        </p:nvSpPr>
+        <p:spPr/>
+        <p:txBody>
+          <a:bodyPr/>
+          <a:lstStyle/>
+          <a:p>
+            <a:r>
+              <a:rPr lang="en-US" dirty="0"/>
+              <a:t>Pending Actions</a:t>
+            </a:r>
+          </a:p>
+        </p:txBody>
+      </p:sp>
+      <p:sp>
+        <p:nvSpPr>
+          <p:cNvPr id="3" name="Content Placeholder 2">
+            <a:extLst>
+              <a:ext uri="{FF2B5EF4-FFF2-40B4-BE49-F238E27FC236}">
+                <a16:creationId xmlns:a16="http://schemas.microsoft.com/office/drawing/2014/main" id="{B855850D-A497-85A5-4CE4-6F02767B4C96}"/>
+              </a:ext>
+            </a:extLst>
+          </p:cNvPr>
+          <p:cNvSpPr>
+            <a:spLocks noGrp="1"/>
+          </p:cNvSpPr>
+          <p:nvPr>
+            <p:ph idx="1"/>
+          </p:nvPr>
+        </p:nvSpPr>
+        <p:spPr/>
+        <p:txBody>
+          <a:bodyPr/>
+          <a:lstStyle/>
+          <a:p>
+            <a:r>
+              <a:rPr lang="en-US" dirty="0"/>
+              <a:t>Unit testing</a:t>
+            </a:r>
+          </a:p>
+          <a:p>
+            <a:r>
+              <a:rPr lang="en-US" dirty="0"/>
+              <a:t>Documentation</a:t>
+            </a:r>
+          </a:p>
+          <a:p>
+            <a:pPr lvl="1"/>
+            <a:r>
+              <a:rPr lang="en-US" dirty="0"/>
+              <a:t>Sprint 2 description page</a:t>
+            </a:r>
+          </a:p>
+          <a:p>
+            <a:pPr lvl="1"/>
+            <a:r>
+              <a:rPr lang="en-US" dirty="0"/>
+              <a:t>Sprint 3 description page</a:t>
+            </a:r>
+          </a:p>
+          <a:p>
+            <a:pPr lvl="1"/>
+            <a:r>
+              <a:rPr lang="en-US" dirty="0"/>
+              <a:t>Upload standups</a:t>
+            </a:r>
+          </a:p>
+          <a:p>
+            <a:pPr lvl="1"/>
+            <a:r>
+              <a:rPr lang="en-US" dirty="0"/>
+              <a:t>Upload retrospective</a:t>
+            </a:r>
+          </a:p>
+          <a:p>
+            <a:pPr lvl="1"/>
+            <a:r>
+              <a:rPr lang="en-US" dirty="0"/>
+              <a:t>Add any</a:t>
+            </a:r>
+          </a:p>
+          <a:p>
+            <a:pPr lvl="1"/>
+            <a:endParaRPr lang="en-US" dirty="0"/>
+          </a:p>
+          <a:p>
+            <a:endParaRPr lang="en-US" dirty="0"/>
+          </a:p>
+        </p:txBody>
+      </p:sp>
+    </p:spTree>
+    <p:extLst>
+      <p:ext uri="{BB962C8B-B14F-4D97-AF65-F5344CB8AC3E}">
+        <p14:creationId xmlns:p14="http://schemas.microsoft.com/office/powerpoint/2010/main" val="702976784"/>
+      </p:ext>
+    </p:extLst>
+  </p:cSld>
+  <p:clrMapOvr>
+    <a:masterClrMapping/>
+  </p:clrMapOvr>
+</p:sld>
+</file>
+
 <file path=ppt/slides/slide2.xml><?xml version="1.0" encoding="utf-8"?>
 <p:sld xmlns:a="http://schemas.openxmlformats.org/drawingml/2006/main" xmlns:r="http://schemas.openxmlformats.org/officeDocument/2006/relationships" xmlns:p="http://schemas.openxmlformats.org/presentationml/2006/main">
   <p:cSld>
@@ -7405,7 +9959,15 @@
           <a:p>
             <a:r>
               <a:rPr lang="en-US" dirty="0"/>
-              <a:t>Agenda</a:t>
+              <a:t>Agenda #1 (Monday June 2</a:t>
+            </a:r>
+            <a:r>
+              <a:rPr lang="en-US" baseline="30000" dirty="0"/>
+              <a:t>nd</a:t>
+            </a:r>
+            <a:r>
+              <a:rPr lang="en-US" dirty="0"/>
+              <a:t>)</a:t>
             </a:r>
           </a:p>
         </p:txBody>
@@ -7521,6 +10083,112 @@
     <p:extLst>
       <p:ext uri="{BB962C8B-B14F-4D97-AF65-F5344CB8AC3E}">
         <p14:creationId xmlns:p14="http://schemas.microsoft.com/office/powerpoint/2010/main" val="3276967932"/>
+      </p:ext>
+    </p:extLst>
+  </p:cSld>
+  <p:clrMapOvr>
+    <a:masterClrMapping/>
+  </p:clrMapOvr>
+</p:sld>
+</file>
+
+<file path=ppt/slides/slide20.xml><?xml version="1.0" encoding="utf-8"?>
+<p:sld xmlns:a="http://schemas.openxmlformats.org/drawingml/2006/main" xmlns:r="http://schemas.openxmlformats.org/officeDocument/2006/relationships" xmlns:p="http://schemas.openxmlformats.org/presentationml/2006/main">
+  <p:cSld>
+    <p:spTree>
+      <p:nvGrpSpPr>
+        <p:cNvPr id="1" name=""/>
+        <p:cNvGrpSpPr/>
+        <p:nvPr/>
+      </p:nvGrpSpPr>
+      <p:grpSpPr>
+        <a:xfrm>
+          <a:off x="0" y="0"/>
+          <a:ext cx="0" cy="0"/>
+          <a:chOff x="0" y="0"/>
+          <a:chExt cx="0" cy="0"/>
+        </a:xfrm>
+      </p:grpSpPr>
+      <p:sp>
+        <p:nvSpPr>
+          <p:cNvPr id="2" name="Title 1">
+            <a:extLst>
+              <a:ext uri="{FF2B5EF4-FFF2-40B4-BE49-F238E27FC236}">
+                <a16:creationId xmlns:a16="http://schemas.microsoft.com/office/drawing/2014/main" id="{A7A9BF5E-C832-5661-4482-C039DDCE237C}"/>
+              </a:ext>
+            </a:extLst>
+          </p:cNvPr>
+          <p:cNvSpPr>
+            <a:spLocks noGrp="1"/>
+          </p:cNvSpPr>
+          <p:nvPr>
+            <p:ph type="title"/>
+          </p:nvPr>
+        </p:nvSpPr>
+        <p:spPr/>
+        <p:txBody>
+          <a:bodyPr/>
+          <a:lstStyle/>
+          <a:p>
+            <a:r>
+              <a:rPr lang="en-US" dirty="0"/>
+              <a:t>Next Steps</a:t>
+            </a:r>
+          </a:p>
+        </p:txBody>
+      </p:sp>
+      <p:sp>
+        <p:nvSpPr>
+          <p:cNvPr id="3" name="Content Placeholder 2">
+            <a:extLst>
+              <a:ext uri="{FF2B5EF4-FFF2-40B4-BE49-F238E27FC236}">
+                <a16:creationId xmlns:a16="http://schemas.microsoft.com/office/drawing/2014/main" id="{C5A3A97C-0234-B349-3659-327ADB58AE31}"/>
+              </a:ext>
+            </a:extLst>
+          </p:cNvPr>
+          <p:cNvSpPr>
+            <a:spLocks noGrp="1"/>
+          </p:cNvSpPr>
+          <p:nvPr>
+            <p:ph idx="1"/>
+          </p:nvPr>
+        </p:nvSpPr>
+        <p:spPr/>
+        <p:txBody>
+          <a:bodyPr/>
+          <a:lstStyle/>
+          <a:p>
+            <a:r>
+              <a:rPr lang="en-US" dirty="0"/>
+              <a:t>Lump left over tasks into separate backlog items</a:t>
+            </a:r>
+          </a:p>
+          <a:p>
+            <a:pPr lvl="1"/>
+            <a:r>
+              <a:rPr lang="en-US" dirty="0"/>
+              <a:t>(1) Documentation issues</a:t>
+            </a:r>
+          </a:p>
+          <a:p>
+            <a:pPr lvl="1"/>
+            <a:r>
+              <a:rPr lang="en-US" dirty="0"/>
+              <a:t>(2) Testing Introduction</a:t>
+            </a:r>
+          </a:p>
+          <a:p>
+            <a:r>
+              <a:rPr lang="en-US" dirty="0"/>
+              <a:t>Complete retrospective</a:t>
+            </a:r>
+          </a:p>
+        </p:txBody>
+      </p:sp>
+    </p:spTree>
+    <p:extLst>
+      <p:ext uri="{BB962C8B-B14F-4D97-AF65-F5344CB8AC3E}">
+        <p14:creationId xmlns:p14="http://schemas.microsoft.com/office/powerpoint/2010/main" val="4034865246"/>
       </p:ext>
     </p:extLst>
   </p:cSld>

</xml_diff>